<commit_message>
Nueva versión presentación Funciones
</commit_message>
<xml_diff>
--- a/Slides/2_Funciones.pptx
+++ b/Slides/2_Funciones.pptx
@@ -5,7 +5,7 @@
     <p:sldMasterId id="2147483672" r:id="rId1"/>
   </p:sldMasterIdLst>
   <p:notesMasterIdLst>
-    <p:notesMasterId r:id="rId13"/>
+    <p:notesMasterId r:id="rId15"/>
   </p:notesMasterIdLst>
   <p:sldIdLst>
     <p:sldId id="257" r:id="rId2"/>
@@ -18,7 +18,9 @@
     <p:sldId id="331" r:id="rId9"/>
     <p:sldId id="332" r:id="rId10"/>
     <p:sldId id="344" r:id="rId11"/>
-    <p:sldId id="343" r:id="rId12"/>
+    <p:sldId id="351" r:id="rId12"/>
+    <p:sldId id="350" r:id="rId13"/>
+    <p:sldId id="343" r:id="rId14"/>
   </p:sldIdLst>
   <p:sldSz cx="13817600" cy="7772400"/>
   <p:notesSz cx="6858000" cy="9144000"/>
@@ -141,7 +143,7 @@
   <pc:docChgLst>
     <pc:chgData name="Cesar Augusto Lopez Gallego" userId="0dfa9112-9251-4882-b472-cf2dfcee09d1" providerId="ADAL" clId="{8526969E-DCD0-46F9-A257-CA6320D7FEB1}"/>
     <pc:docChg chg="undo custSel addSld delSld modSld">
-      <pc:chgData name="Cesar Augusto Lopez Gallego" userId="0dfa9112-9251-4882-b472-cf2dfcee09d1" providerId="ADAL" clId="{8526969E-DCD0-46F9-A257-CA6320D7FEB1}" dt="2024-07-23T14:45:30.327" v="3231" actId="47"/>
+      <pc:chgData name="Cesar Augusto Lopez Gallego" userId="0dfa9112-9251-4882-b472-cf2dfcee09d1" providerId="ADAL" clId="{8526969E-DCD0-46F9-A257-CA6320D7FEB1}" dt="2024-07-24T02:22:38.484" v="4123" actId="20577"/>
       <pc:docMkLst>
         <pc:docMk/>
       </pc:docMkLst>
@@ -269,20 +271,100 @@
           <pc:sldMk cId="1132471970" sldId="333"/>
         </pc:sldMkLst>
       </pc:sldChg>
-      <pc:sldChg chg="modSp mod">
-        <pc:chgData name="Cesar Augusto Lopez Gallego" userId="0dfa9112-9251-4882-b472-cf2dfcee09d1" providerId="ADAL" clId="{8526969E-DCD0-46F9-A257-CA6320D7FEB1}" dt="2024-07-23T13:03:42.617" v="115" actId="27636"/>
+      <pc:sldChg chg="addSp delSp modSp mod">
+        <pc:chgData name="Cesar Augusto Lopez Gallego" userId="0dfa9112-9251-4882-b472-cf2dfcee09d1" providerId="ADAL" clId="{8526969E-DCD0-46F9-A257-CA6320D7FEB1}" dt="2024-07-24T02:15:01.223" v="4010" actId="20577"/>
         <pc:sldMkLst>
           <pc:docMk/>
           <pc:sldMk cId="3794522921" sldId="344"/>
         </pc:sldMkLst>
         <pc:spChg chg="mod">
-          <ac:chgData name="Cesar Augusto Lopez Gallego" userId="0dfa9112-9251-4882-b472-cf2dfcee09d1" providerId="ADAL" clId="{8526969E-DCD0-46F9-A257-CA6320D7FEB1}" dt="2024-07-23T13:03:42.617" v="115" actId="27636"/>
+          <ac:chgData name="Cesar Augusto Lopez Gallego" userId="0dfa9112-9251-4882-b472-cf2dfcee09d1" providerId="ADAL" clId="{8526969E-DCD0-46F9-A257-CA6320D7FEB1}" dt="2024-07-24T02:15:01.223" v="4010" actId="20577"/>
+          <ac:spMkLst>
+            <pc:docMk/>
+            <pc:sldMk cId="3794522921" sldId="344"/>
+            <ac:spMk id="2" creationId="{A1D70367-6250-4AE5-8807-00631BCF6480}"/>
+          </ac:spMkLst>
+        </pc:spChg>
+        <pc:spChg chg="mod">
+          <ac:chgData name="Cesar Augusto Lopez Gallego" userId="0dfa9112-9251-4882-b472-cf2dfcee09d1" providerId="ADAL" clId="{8526969E-DCD0-46F9-A257-CA6320D7FEB1}" dt="2024-07-24T02:04:12.350" v="3648" actId="27636"/>
           <ac:spMkLst>
             <pc:docMk/>
             <pc:sldMk cId="3794522921" sldId="344"/>
             <ac:spMk id="3" creationId="{0988B930-7D03-4921-AABC-62601C83CBE3}"/>
           </ac:spMkLst>
         </pc:spChg>
+        <pc:spChg chg="mod">
+          <ac:chgData name="Cesar Augusto Lopez Gallego" userId="0dfa9112-9251-4882-b472-cf2dfcee09d1" providerId="ADAL" clId="{8526969E-DCD0-46F9-A257-CA6320D7FEB1}" dt="2024-07-24T01:59:32.129" v="3484" actId="1582"/>
+          <ac:spMkLst>
+            <pc:docMk/>
+            <pc:sldMk cId="3794522921" sldId="344"/>
+            <ac:spMk id="4" creationId="{D5977F79-CA29-4D31-A39A-8C8427C4245D}"/>
+          </ac:spMkLst>
+        </pc:spChg>
+        <pc:spChg chg="mod">
+          <ac:chgData name="Cesar Augusto Lopez Gallego" userId="0dfa9112-9251-4882-b472-cf2dfcee09d1" providerId="ADAL" clId="{8526969E-DCD0-46F9-A257-CA6320D7FEB1}" dt="2024-07-24T01:59:47.581" v="3486" actId="1582"/>
+          <ac:spMkLst>
+            <pc:docMk/>
+            <pc:sldMk cId="3794522921" sldId="344"/>
+            <ac:spMk id="5" creationId="{A8C7853C-5D2A-4D90-AE60-F836519E9B0C}"/>
+          </ac:spMkLst>
+        </pc:spChg>
+        <pc:spChg chg="mod">
+          <ac:chgData name="Cesar Augusto Lopez Gallego" userId="0dfa9112-9251-4882-b472-cf2dfcee09d1" providerId="ADAL" clId="{8526969E-DCD0-46F9-A257-CA6320D7FEB1}" dt="2024-07-24T02:04:18.872" v="3649" actId="1076"/>
+          <ac:spMkLst>
+            <pc:docMk/>
+            <pc:sldMk cId="3794522921" sldId="344"/>
+            <ac:spMk id="6" creationId="{6E3CE605-D037-4E39-9A4A-6901250EE3AE}"/>
+          </ac:spMkLst>
+        </pc:spChg>
+        <pc:spChg chg="add mod">
+          <ac:chgData name="Cesar Augusto Lopez Gallego" userId="0dfa9112-9251-4882-b472-cf2dfcee09d1" providerId="ADAL" clId="{8526969E-DCD0-46F9-A257-CA6320D7FEB1}" dt="2024-07-24T02:05:58.729" v="3728" actId="20577"/>
+          <ac:spMkLst>
+            <pc:docMk/>
+            <pc:sldMk cId="3794522921" sldId="344"/>
+            <ac:spMk id="7" creationId="{7908272A-2432-47D6-886B-5BDBC956FB4C}"/>
+          </ac:spMkLst>
+        </pc:spChg>
+        <pc:spChg chg="mod">
+          <ac:chgData name="Cesar Augusto Lopez Gallego" userId="0dfa9112-9251-4882-b472-cf2dfcee09d1" providerId="ADAL" clId="{8526969E-DCD0-46F9-A257-CA6320D7FEB1}" dt="2024-07-24T02:01:44.640" v="3498" actId="1582"/>
+          <ac:spMkLst>
+            <pc:docMk/>
+            <pc:sldMk cId="3794522921" sldId="344"/>
+            <ac:spMk id="8" creationId="{563976C9-42AB-4C12-9B0C-EB9CFD964CBD}"/>
+          </ac:spMkLst>
+        </pc:spChg>
+        <pc:spChg chg="mod">
+          <ac:chgData name="Cesar Augusto Lopez Gallego" userId="0dfa9112-9251-4882-b472-cf2dfcee09d1" providerId="ADAL" clId="{8526969E-DCD0-46F9-A257-CA6320D7FEB1}" dt="2024-07-24T02:00:51.315" v="3492" actId="1582"/>
+          <ac:spMkLst>
+            <pc:docMk/>
+            <pc:sldMk cId="3794522921" sldId="344"/>
+            <ac:spMk id="9" creationId="{4F79790F-077B-40B8-939C-2D6C5BFADEC9}"/>
+          </ac:spMkLst>
+        </pc:spChg>
+        <pc:spChg chg="del mod">
+          <ac:chgData name="Cesar Augusto Lopez Gallego" userId="0dfa9112-9251-4882-b472-cf2dfcee09d1" providerId="ADAL" clId="{8526969E-DCD0-46F9-A257-CA6320D7FEB1}" dt="2024-07-24T02:04:37.274" v="3653" actId="478"/>
+          <ac:spMkLst>
+            <pc:docMk/>
+            <pc:sldMk cId="3794522921" sldId="344"/>
+            <ac:spMk id="10" creationId="{D9398874-116D-406D-815F-997675AC34F4}"/>
+          </ac:spMkLst>
+        </pc:spChg>
+        <pc:cxnChg chg="add mod">
+          <ac:chgData name="Cesar Augusto Lopez Gallego" userId="0dfa9112-9251-4882-b472-cf2dfcee09d1" providerId="ADAL" clId="{8526969E-DCD0-46F9-A257-CA6320D7FEB1}" dt="2024-07-24T02:06:40.002" v="3731" actId="14100"/>
+          <ac:cxnSpMkLst>
+            <pc:docMk/>
+            <pc:sldMk cId="3794522921" sldId="344"/>
+            <ac:cxnSpMk id="12" creationId="{8AB42BDF-C322-4436-AAA6-5F22EC708CE3}"/>
+          </ac:cxnSpMkLst>
+        </pc:cxnChg>
+        <pc:cxnChg chg="add mod">
+          <ac:chgData name="Cesar Augusto Lopez Gallego" userId="0dfa9112-9251-4882-b472-cf2dfcee09d1" providerId="ADAL" clId="{8526969E-DCD0-46F9-A257-CA6320D7FEB1}" dt="2024-07-24T02:06:54.476" v="3733" actId="14100"/>
+          <ac:cxnSpMkLst>
+            <pc:docMk/>
+            <pc:sldMk cId="3794522921" sldId="344"/>
+            <ac:cxnSpMk id="15" creationId="{F3B9460D-4D06-4E76-8541-428B41D35EEC}"/>
+          </ac:cxnSpMkLst>
+        </pc:cxnChg>
       </pc:sldChg>
       <pc:sldChg chg="addSp modSp new mod modAnim">
         <pc:chgData name="Cesar Augusto Lopez Gallego" userId="0dfa9112-9251-4882-b472-cf2dfcee09d1" providerId="ADAL" clId="{8526969E-DCD0-46F9-A257-CA6320D7FEB1}" dt="2024-07-23T13:33:38.046" v="1211" actId="1076"/>
@@ -395,7 +477,7 @@
         </pc:picChg>
       </pc:sldChg>
       <pc:sldChg chg="addSp delSp modSp new mod modAnim">
-        <pc:chgData name="Cesar Augusto Lopez Gallego" userId="0dfa9112-9251-4882-b472-cf2dfcee09d1" providerId="ADAL" clId="{8526969E-DCD0-46F9-A257-CA6320D7FEB1}" dt="2024-07-23T13:56:35.639" v="2674" actId="20577"/>
+        <pc:chgData name="Cesar Augusto Lopez Gallego" userId="0dfa9112-9251-4882-b472-cf2dfcee09d1" providerId="ADAL" clId="{8526969E-DCD0-46F9-A257-CA6320D7FEB1}" dt="2024-07-24T01:47:25.013" v="3299" actId="6549"/>
         <pc:sldMkLst>
           <pc:docMk/>
           <pc:sldMk cId="3078981022" sldId="347"/>
@@ -441,7 +523,7 @@
           </ac:spMkLst>
         </pc:spChg>
         <pc:spChg chg="add mod">
-          <ac:chgData name="Cesar Augusto Lopez Gallego" userId="0dfa9112-9251-4882-b472-cf2dfcee09d1" providerId="ADAL" clId="{8526969E-DCD0-46F9-A257-CA6320D7FEB1}" dt="2024-07-23T13:46:37.709" v="1899" actId="113"/>
+          <ac:chgData name="Cesar Augusto Lopez Gallego" userId="0dfa9112-9251-4882-b472-cf2dfcee09d1" providerId="ADAL" clId="{8526969E-DCD0-46F9-A257-CA6320D7FEB1}" dt="2024-07-24T01:46:27.260" v="3281" actId="20577"/>
           <ac:spMkLst>
             <pc:docMk/>
             <pc:sldMk cId="3078981022" sldId="347"/>
@@ -449,7 +531,7 @@
           </ac:spMkLst>
         </pc:spChg>
         <pc:spChg chg="add mod">
-          <ac:chgData name="Cesar Augusto Lopez Gallego" userId="0dfa9112-9251-4882-b472-cf2dfcee09d1" providerId="ADAL" clId="{8526969E-DCD0-46F9-A257-CA6320D7FEB1}" dt="2024-07-23T13:56:35.639" v="2674" actId="20577"/>
+          <ac:chgData name="Cesar Augusto Lopez Gallego" userId="0dfa9112-9251-4882-b472-cf2dfcee09d1" providerId="ADAL" clId="{8526969E-DCD0-46F9-A257-CA6320D7FEB1}" dt="2024-07-24T01:47:25.013" v="3299" actId="6549"/>
           <ac:spMkLst>
             <pc:docMk/>
             <pc:sldMk cId="3078981022" sldId="347"/>
@@ -490,7 +572,7 @@
         </pc:cxnChg>
       </pc:sldChg>
       <pc:sldChg chg="addSp delSp modSp new mod modAnim">
-        <pc:chgData name="Cesar Augusto Lopez Gallego" userId="0dfa9112-9251-4882-b472-cf2dfcee09d1" providerId="ADAL" clId="{8526969E-DCD0-46F9-A257-CA6320D7FEB1}" dt="2024-07-23T14:43:14.188" v="3141" actId="11529"/>
+        <pc:chgData name="Cesar Augusto Lopez Gallego" userId="0dfa9112-9251-4882-b472-cf2dfcee09d1" providerId="ADAL" clId="{8526969E-DCD0-46F9-A257-CA6320D7FEB1}" dt="2024-07-24T01:54:02.363" v="3375"/>
         <pc:sldMkLst>
           <pc:docMk/>
           <pc:sldMk cId="2202594975" sldId="348"/>
@@ -568,7 +650,7 @@
           </ac:spMkLst>
         </pc:spChg>
         <pc:spChg chg="add mod">
-          <ac:chgData name="Cesar Augusto Lopez Gallego" userId="0dfa9112-9251-4882-b472-cf2dfcee09d1" providerId="ADAL" clId="{8526969E-DCD0-46F9-A257-CA6320D7FEB1}" dt="2024-07-23T14:42:43.738" v="3136" actId="1076"/>
+          <ac:chgData name="Cesar Augusto Lopez Gallego" userId="0dfa9112-9251-4882-b472-cf2dfcee09d1" providerId="ADAL" clId="{8526969E-DCD0-46F9-A257-CA6320D7FEB1}" dt="2024-07-24T01:53:26.040" v="3371" actId="1037"/>
           <ac:spMkLst>
             <pc:docMk/>
             <pc:sldMk cId="2202594975" sldId="348"/>
@@ -625,7 +707,7 @@
         </pc:cxnChg>
       </pc:sldChg>
       <pc:sldChg chg="addSp delSp modSp new mod modAnim">
-        <pc:chgData name="Cesar Augusto Lopez Gallego" userId="0dfa9112-9251-4882-b472-cf2dfcee09d1" providerId="ADAL" clId="{8526969E-DCD0-46F9-A257-CA6320D7FEB1}" dt="2024-07-23T14:39:39.477" v="2957" actId="14100"/>
+        <pc:chgData name="Cesar Augusto Lopez Gallego" userId="0dfa9112-9251-4882-b472-cf2dfcee09d1" providerId="ADAL" clId="{8526969E-DCD0-46F9-A257-CA6320D7FEB1}" dt="2024-07-24T01:50:53.054" v="3344"/>
         <pc:sldMkLst>
           <pc:docMk/>
           <pc:sldMk cId="4150399364" sldId="349"/>
@@ -822,6 +904,140 @@
             <ac:cxnSpMk id="45" creationId="{886CE87B-55C8-4866-AD10-9B2677E89A54}"/>
           </ac:cxnSpMkLst>
         </pc:cxnChg>
+      </pc:sldChg>
+      <pc:sldChg chg="addSp delSp modSp new mod">
+        <pc:chgData name="Cesar Augusto Lopez Gallego" userId="0dfa9112-9251-4882-b472-cf2dfcee09d1" providerId="ADAL" clId="{8526969E-DCD0-46F9-A257-CA6320D7FEB1}" dt="2024-07-24T02:22:38.484" v="4123" actId="20577"/>
+        <pc:sldMkLst>
+          <pc:docMk/>
+          <pc:sldMk cId="420833290" sldId="350"/>
+        </pc:sldMkLst>
+        <pc:spChg chg="mod">
+          <ac:chgData name="Cesar Augusto Lopez Gallego" userId="0dfa9112-9251-4882-b472-cf2dfcee09d1" providerId="ADAL" clId="{8526969E-DCD0-46F9-A257-CA6320D7FEB1}" dt="2024-07-24T02:10:14.924" v="3869" actId="404"/>
+          <ac:spMkLst>
+            <pc:docMk/>
+            <pc:sldMk cId="420833290" sldId="350"/>
+            <ac:spMk id="2" creationId="{8BA6D4EF-C7C2-427B-888C-A8030A09C4CE}"/>
+          </ac:spMkLst>
+        </pc:spChg>
+        <pc:spChg chg="del">
+          <ac:chgData name="Cesar Augusto Lopez Gallego" userId="0dfa9112-9251-4882-b472-cf2dfcee09d1" providerId="ADAL" clId="{8526969E-DCD0-46F9-A257-CA6320D7FEB1}" dt="2024-07-24T02:07:33.548" v="3756" actId="478"/>
+          <ac:spMkLst>
+            <pc:docMk/>
+            <pc:sldMk cId="420833290" sldId="350"/>
+            <ac:spMk id="3" creationId="{BE06DB3C-F6EF-4D6C-A1F9-022F0321BE8C}"/>
+          </ac:spMkLst>
+        </pc:spChg>
+        <pc:spChg chg="add mod">
+          <ac:chgData name="Cesar Augusto Lopez Gallego" userId="0dfa9112-9251-4882-b472-cf2dfcee09d1" providerId="ADAL" clId="{8526969E-DCD0-46F9-A257-CA6320D7FEB1}" dt="2024-07-24T02:11:04.507" v="3874" actId="1076"/>
+          <ac:spMkLst>
+            <pc:docMk/>
+            <pc:sldMk cId="420833290" sldId="350"/>
+            <ac:spMk id="4" creationId="{400BAF08-3D98-44A7-9B29-0C3C2AA77929}"/>
+          </ac:spMkLst>
+        </pc:spChg>
+        <pc:spChg chg="add mod ord">
+          <ac:chgData name="Cesar Augusto Lopez Gallego" userId="0dfa9112-9251-4882-b472-cf2dfcee09d1" providerId="ADAL" clId="{8526969E-DCD0-46F9-A257-CA6320D7FEB1}" dt="2024-07-24T02:22:38.484" v="4123" actId="20577"/>
+          <ac:spMkLst>
+            <pc:docMk/>
+            <pc:sldMk cId="420833290" sldId="350"/>
+            <ac:spMk id="5" creationId="{2E7EC907-EA33-4A08-A162-3CAE668B2808}"/>
+          </ac:spMkLst>
+        </pc:spChg>
+        <pc:spChg chg="add mod">
+          <ac:chgData name="Cesar Augusto Lopez Gallego" userId="0dfa9112-9251-4882-b472-cf2dfcee09d1" providerId="ADAL" clId="{8526969E-DCD0-46F9-A257-CA6320D7FEB1}" dt="2024-07-24T02:11:04.507" v="3874" actId="1076"/>
+          <ac:spMkLst>
+            <pc:docMk/>
+            <pc:sldMk cId="420833290" sldId="350"/>
+            <ac:spMk id="6" creationId="{52565B3D-1C97-45E3-A982-7F5C8FAE8633}"/>
+          </ac:spMkLst>
+        </pc:spChg>
+        <pc:spChg chg="add mod">
+          <ac:chgData name="Cesar Augusto Lopez Gallego" userId="0dfa9112-9251-4882-b472-cf2dfcee09d1" providerId="ADAL" clId="{8526969E-DCD0-46F9-A257-CA6320D7FEB1}" dt="2024-07-24T02:11:04.507" v="3874" actId="1076"/>
+          <ac:spMkLst>
+            <pc:docMk/>
+            <pc:sldMk cId="420833290" sldId="350"/>
+            <ac:spMk id="7" creationId="{83602483-C30A-4F9F-8E88-FFA1B0F7232A}"/>
+          </ac:spMkLst>
+        </pc:spChg>
+        <pc:spChg chg="add mod">
+          <ac:chgData name="Cesar Augusto Lopez Gallego" userId="0dfa9112-9251-4882-b472-cf2dfcee09d1" providerId="ADAL" clId="{8526969E-DCD0-46F9-A257-CA6320D7FEB1}" dt="2024-07-24T02:11:40.857" v="3929" actId="20577"/>
+          <ac:spMkLst>
+            <pc:docMk/>
+            <pc:sldMk cId="420833290" sldId="350"/>
+            <ac:spMk id="8" creationId="{E52E8DE9-4AC8-4607-A773-20C46997D07F}"/>
+          </ac:spMkLst>
+        </pc:spChg>
+      </pc:sldChg>
+      <pc:sldChg chg="addSp delSp modSp new mod modAnim">
+        <pc:chgData name="Cesar Augusto Lopez Gallego" userId="0dfa9112-9251-4882-b472-cf2dfcee09d1" providerId="ADAL" clId="{8526969E-DCD0-46F9-A257-CA6320D7FEB1}" dt="2024-07-24T02:22:18.384" v="4100"/>
+        <pc:sldMkLst>
+          <pc:docMk/>
+          <pc:sldMk cId="1374845394" sldId="351"/>
+        </pc:sldMkLst>
+        <pc:spChg chg="mod">
+          <ac:chgData name="Cesar Augusto Lopez Gallego" userId="0dfa9112-9251-4882-b472-cf2dfcee09d1" providerId="ADAL" clId="{8526969E-DCD0-46F9-A257-CA6320D7FEB1}" dt="2024-07-24T02:19:36.886" v="4078" actId="20577"/>
+          <ac:spMkLst>
+            <pc:docMk/>
+            <pc:sldMk cId="1374845394" sldId="351"/>
+            <ac:spMk id="2" creationId="{2C5C3021-36BB-4F4D-A4B1-10E2987AE81B}"/>
+          </ac:spMkLst>
+        </pc:spChg>
+        <pc:spChg chg="del">
+          <ac:chgData name="Cesar Augusto Lopez Gallego" userId="0dfa9112-9251-4882-b472-cf2dfcee09d1" providerId="ADAL" clId="{8526969E-DCD0-46F9-A257-CA6320D7FEB1}" dt="2024-07-24T02:12:16.798" v="3948" actId="478"/>
+          <ac:spMkLst>
+            <pc:docMk/>
+            <pc:sldMk cId="1374845394" sldId="351"/>
+            <ac:spMk id="3" creationId="{763F2777-2785-4428-95F6-199E21168E01}"/>
+          </ac:spMkLst>
+        </pc:spChg>
+        <pc:spChg chg="add mod">
+          <ac:chgData name="Cesar Augusto Lopez Gallego" userId="0dfa9112-9251-4882-b472-cf2dfcee09d1" providerId="ADAL" clId="{8526969E-DCD0-46F9-A257-CA6320D7FEB1}" dt="2024-07-24T02:20:32.287" v="4083" actId="2711"/>
+          <ac:spMkLst>
+            <pc:docMk/>
+            <pc:sldMk cId="1374845394" sldId="351"/>
+            <ac:spMk id="5" creationId="{EB58747B-A0A4-4D28-8C08-DBAC551BFEB2}"/>
+          </ac:spMkLst>
+        </pc:spChg>
+        <pc:spChg chg="add mod">
+          <ac:chgData name="Cesar Augusto Lopez Gallego" userId="0dfa9112-9251-4882-b472-cf2dfcee09d1" providerId="ADAL" clId="{8526969E-DCD0-46F9-A257-CA6320D7FEB1}" dt="2024-07-24T02:20:36.831" v="4084" actId="108"/>
+          <ac:spMkLst>
+            <pc:docMk/>
+            <pc:sldMk cId="1374845394" sldId="351"/>
+            <ac:spMk id="7" creationId="{DDDB331B-A30D-4302-AC12-5F4C2ED4E72C}"/>
+          </ac:spMkLst>
+        </pc:spChg>
+        <pc:spChg chg="add mod">
+          <ac:chgData name="Cesar Augusto Lopez Gallego" userId="0dfa9112-9251-4882-b472-cf2dfcee09d1" providerId="ADAL" clId="{8526969E-DCD0-46F9-A257-CA6320D7FEB1}" dt="2024-07-24T02:20:38.927" v="4085" actId="108"/>
+          <ac:spMkLst>
+            <pc:docMk/>
+            <pc:sldMk cId="1374845394" sldId="351"/>
+            <ac:spMk id="9" creationId="{575F2964-7A12-496B-823A-518678AFAEE3}"/>
+          </ac:spMkLst>
+        </pc:spChg>
+        <pc:spChg chg="add mod">
+          <ac:chgData name="Cesar Augusto Lopez Gallego" userId="0dfa9112-9251-4882-b472-cf2dfcee09d1" providerId="ADAL" clId="{8526969E-DCD0-46F9-A257-CA6320D7FEB1}" dt="2024-07-24T02:21:34.981" v="4097" actId="207"/>
+          <ac:spMkLst>
+            <pc:docMk/>
+            <pc:sldMk cId="1374845394" sldId="351"/>
+            <ac:spMk id="11" creationId="{11C2F71C-C6B6-4AA2-9580-593FB99EE62A}"/>
+          </ac:spMkLst>
+        </pc:spChg>
+        <pc:spChg chg="add mod">
+          <ac:chgData name="Cesar Augusto Lopez Gallego" userId="0dfa9112-9251-4882-b472-cf2dfcee09d1" providerId="ADAL" clId="{8526969E-DCD0-46F9-A257-CA6320D7FEB1}" dt="2024-07-24T02:21:34.981" v="4097" actId="207"/>
+          <ac:spMkLst>
+            <pc:docMk/>
+            <pc:sldMk cId="1374845394" sldId="351"/>
+            <ac:spMk id="13" creationId="{C3825CF4-3C6D-40ED-93B9-91B6928195B6}"/>
+          </ac:spMkLst>
+        </pc:spChg>
+        <pc:spChg chg="add mod">
+          <ac:chgData name="Cesar Augusto Lopez Gallego" userId="0dfa9112-9251-4882-b472-cf2dfcee09d1" providerId="ADAL" clId="{8526969E-DCD0-46F9-A257-CA6320D7FEB1}" dt="2024-07-24T02:21:34.981" v="4097" actId="207"/>
+          <ac:spMkLst>
+            <pc:docMk/>
+            <pc:sldMk cId="1374845394" sldId="351"/>
+            <ac:spMk id="15" creationId="{7D6152DE-3307-45B2-ACAA-46BC19CFA1B6}"/>
+          </ac:spMkLst>
+        </pc:spChg>
       </pc:sldChg>
     </pc:docChg>
   </pc:docChgLst>
@@ -4108,7 +4324,12 @@
             <p:ph type="title"/>
           </p:nvPr>
         </p:nvSpPr>
-        <p:spPr/>
+        <p:spPr>
+          <a:xfrm>
+            <a:off x="949960" y="413810"/>
+            <a:ext cx="11917680" cy="928980"/>
+          </a:xfrm>
+        </p:spPr>
         <p:txBody>
           <a:bodyPr/>
           <a:lstStyle/>
@@ -4116,6 +4337,22 @@
             <a:r>
               <a:rPr lang="en-US" dirty="0" err="1"/>
               <a:t>Sintaxis</a:t>
+            </a:r>
+            <a:r>
+              <a:rPr lang="en-US" dirty="0"/>
+              <a:t> para </a:t>
+            </a:r>
+            <a:r>
+              <a:rPr lang="en-US" dirty="0" err="1"/>
+              <a:t>definir</a:t>
+            </a:r>
+            <a:r>
+              <a:rPr lang="en-US" dirty="0"/>
+              <a:t> la </a:t>
+            </a:r>
+            <a:r>
+              <a:rPr lang="en-US" dirty="0" err="1"/>
+              <a:t>función</a:t>
             </a:r>
             <a:endParaRPr lang="es-CO" dirty="0"/>
           </a:p>
@@ -4139,13 +4376,13 @@
         </p:nvSpPr>
         <p:spPr>
           <a:xfrm>
-            <a:off x="949960" y="2900854"/>
-            <a:ext cx="11917680" cy="4099703"/>
+            <a:off x="414381" y="3083734"/>
+            <a:ext cx="12896669" cy="4099703"/>
           </a:xfrm>
         </p:spPr>
         <p:txBody>
           <a:bodyPr>
-            <a:normAutofit fontScale="77500" lnSpcReduction="20000"/>
+            <a:normAutofit fontScale="70000" lnSpcReduction="20000"/>
           </a:bodyPr>
           <a:lstStyle/>
           <a:p>
@@ -4153,31 +4390,95 @@
               <a:buNone/>
             </a:pPr>
             <a:r>
+              <a:rPr lang="es-CO" dirty="0">
+                <a:solidFill>
+                  <a:srgbClr val="C00000"/>
+                </a:solidFill>
+              </a:rPr>
+              <a:t>[acceso]</a:t>
+            </a:r>
+            <a:r>
               <a:rPr lang="es-CO" dirty="0"/>
-              <a:t>[acceso] [modificador] tipo </a:t>
-            </a:r>
-            <a:r>
-              <a:rPr lang="es-CO" dirty="0" err="1"/>
+              <a:t> </a:t>
+            </a:r>
+            <a:r>
+              <a:rPr lang="es-CO" dirty="0">
+                <a:solidFill>
+                  <a:schemeClr val="accent6"/>
+                </a:solidFill>
+              </a:rPr>
+              <a:t>[modificador]</a:t>
+            </a:r>
+            <a:r>
+              <a:rPr lang="es-CO" dirty="0"/>
+              <a:t> </a:t>
+            </a:r>
+            <a:r>
+              <a:rPr lang="es-CO" dirty="0">
+                <a:solidFill>
+                  <a:schemeClr val="accent1"/>
+                </a:solidFill>
+              </a:rPr>
+              <a:t>tipo</a:t>
+            </a:r>
+            <a:r>
+              <a:rPr lang="es-CO" dirty="0"/>
+              <a:t> </a:t>
+            </a:r>
+            <a:r>
+              <a:rPr lang="es-CO" dirty="0" err="1">
+                <a:solidFill>
+                  <a:schemeClr val="accent2"/>
+                </a:solidFill>
+              </a:rPr>
               <a:t>nombreFuncion</a:t>
             </a:r>
             <a:r>
-              <a:rPr lang="es-CO" dirty="0"/>
+              <a:rPr lang="es-CO" dirty="0">
+                <a:solidFill>
+                  <a:schemeClr val="accent2"/>
+                </a:solidFill>
+              </a:rPr>
+              <a:t> </a:t>
+            </a:r>
+            <a:r>
+              <a:rPr lang="es-CO" dirty="0">
+                <a:solidFill>
+                  <a:srgbClr val="00FFFF"/>
+                </a:solidFill>
+              </a:rPr>
               <a:t>([tipo </a:t>
             </a:r>
             <a:r>
-              <a:rPr lang="es-CO" dirty="0" err="1"/>
+              <a:rPr lang="es-CO" dirty="0" err="1">
+                <a:solidFill>
+                  <a:srgbClr val="00FFFF"/>
+                </a:solidFill>
+              </a:rPr>
               <a:t>nombreParametro</a:t>
             </a:r>
             <a:r>
-              <a:rPr lang="es-CO" dirty="0"/>
+              <a:rPr lang="es-CO" dirty="0">
+                <a:solidFill>
+                  <a:srgbClr val="00FFFF"/>
+                </a:solidFill>
+              </a:rPr>
               <a:t>,[tipo </a:t>
             </a:r>
             <a:r>
-              <a:rPr lang="es-CO" dirty="0" err="1"/>
+              <a:rPr lang="es-CO" dirty="0" err="1">
+                <a:solidFill>
+                  <a:srgbClr val="00FFFF"/>
+                </a:solidFill>
+              </a:rPr>
               <a:t>nombreParametro</a:t>
             </a:r>
             <a:r>
-              <a:rPr lang="es-CO" dirty="0"/>
+              <a:rPr lang="es-CO" dirty="0">
+                <a:solidFill>
+                  <a:srgbClr val="00FFFF"/>
+                </a:solidFill>
+              </a:rPr>
               <a:t>]...])</a:t>
             </a:r>
           </a:p>
@@ -4196,7 +4497,7 @@
             </a:pPr>
             <a:r>
               <a:rPr lang="es-CO" dirty="0"/>
-              <a:t>	/*</a:t>
+              <a:t>	try{</a:t>
             </a:r>
           </a:p>
           <a:p>
@@ -4205,7 +4506,7 @@
             </a:pPr>
             <a:r>
               <a:rPr lang="es-CO" dirty="0"/>
-              <a:t>		* Bloque de instrucciones</a:t>
+              <a:t>		&lt;&lt;instrucciones&gt;&gt;</a:t>
             </a:r>
           </a:p>
           <a:p>
@@ -4214,7 +4515,93 @@
             </a:pPr>
             <a:r>
               <a:rPr lang="es-CO" dirty="0"/>
-              <a:t>	*/</a:t>
+              <a:t>		</a:t>
+            </a:r>
+            <a:r>
+              <a:rPr lang="es-CO" dirty="0" err="1"/>
+              <a:t>return</a:t>
+            </a:r>
+            <a:r>
+              <a:rPr lang="es-CO" dirty="0"/>
+              <a:t> &lt;&lt;del mismo tipo de la función&gt;&gt;</a:t>
+            </a:r>
+          </a:p>
+          <a:p>
+            <a:pPr marL="0" indent="0">
+              <a:buNone/>
+            </a:pPr>
+            <a:r>
+              <a:rPr lang="es-CO" dirty="0"/>
+              <a:t>	}</a:t>
+            </a:r>
+          </a:p>
+          <a:p>
+            <a:pPr marL="0" indent="0">
+              <a:buNone/>
+            </a:pPr>
+            <a:r>
+              <a:rPr lang="es-CO" dirty="0"/>
+              <a:t>	catch(</a:t>
+            </a:r>
+            <a:r>
+              <a:rPr lang="es-CO" dirty="0" err="1"/>
+              <a:t>Exception</a:t>
+            </a:r>
+            <a:r>
+              <a:rPr lang="es-CO" dirty="0"/>
+              <a:t> </a:t>
+            </a:r>
+            <a:r>
+              <a:rPr lang="es-CO" dirty="0" err="1"/>
+              <a:t>err</a:t>
+            </a:r>
+            <a:r>
+              <a:rPr lang="es-CO" dirty="0"/>
+              <a:t>){</a:t>
+            </a:r>
+          </a:p>
+          <a:p>
+            <a:pPr marL="0" indent="0">
+              <a:buNone/>
+            </a:pPr>
+            <a:r>
+              <a:rPr lang="es-CO" dirty="0"/>
+              <a:t>		&lt;&lt;mensaje de error&gt;&gt;</a:t>
+            </a:r>
+          </a:p>
+          <a:p>
+            <a:pPr marL="0" indent="0">
+              <a:buNone/>
+            </a:pPr>
+            <a:r>
+              <a:rPr lang="es-CO" dirty="0"/>
+              <a:t>		</a:t>
+            </a:r>
+            <a:r>
+              <a:rPr lang="es-CO" dirty="0" err="1"/>
+              <a:t>return</a:t>
+            </a:r>
+            <a:r>
+              <a:rPr lang="es-CO" dirty="0"/>
+              <a:t> &lt;&lt;del mismo tipo de la función&gt;&gt;	</a:t>
+            </a:r>
+          </a:p>
+          <a:p>
+            <a:pPr marL="0" indent="0">
+              <a:buNone/>
+            </a:pPr>
+            <a:r>
+              <a:rPr lang="es-CO" dirty="0"/>
+              <a:t>	}</a:t>
+            </a:r>
+          </a:p>
+          <a:p>
+            <a:pPr marL="0" indent="0">
+              <a:buNone/>
+            </a:pPr>
+            <a:r>
+              <a:rPr lang="es-CO" dirty="0"/>
+              <a:t>}</a:t>
             </a:r>
           </a:p>
           <a:p>
@@ -4222,41 +4609,6 @@
               <a:buNone/>
             </a:pPr>
             <a:endParaRPr lang="es-CO" dirty="0"/>
-          </a:p>
-          <a:p>
-            <a:pPr marL="0" indent="0">
-              <a:buNone/>
-            </a:pPr>
-            <a:r>
-              <a:rPr lang="es-CO" dirty="0"/>
-              <a:t>	</a:t>
-            </a:r>
-            <a:r>
-              <a:rPr lang="es-CO" dirty="0" err="1"/>
-              <a:t>return</a:t>
-            </a:r>
-            <a:r>
-              <a:rPr lang="es-CO" dirty="0"/>
-              <a:t> valor;</a:t>
-            </a:r>
-          </a:p>
-          <a:p>
-            <a:pPr marL="0" indent="0">
-              <a:buNone/>
-            </a:pPr>
-            <a:r>
-              <a:rPr lang="es-CO" dirty="0"/>
-              <a:t>}</a:t>
-            </a:r>
-          </a:p>
-          <a:p>
-            <a:pPr marL="0" indent="0">
-              <a:buNone/>
-            </a:pPr>
-            <a:r>
-              <a:rPr lang="es-CO" dirty="0"/>
-              <a:t>	</a:t>
-            </a:r>
           </a:p>
         </p:txBody>
       </p:sp>
@@ -4284,6 +4636,11 @@
             </a:avLst>
           </a:prstGeom>
           <a:noFill/>
+          <a:ln w="38100">
+            <a:solidFill>
+              <a:srgbClr val="C00000"/>
+            </a:solidFill>
+          </a:ln>
         </p:spPr>
         <p:style>
           <a:lnRef idx="2">
@@ -4307,48 +4664,44 @@
           <a:p>
             <a:pPr algn="ctr"/>
             <a:r>
-              <a:rPr lang="en-US" dirty="0" err="1">
+              <a:rPr lang="en-US" b="1" dirty="0">
                 <a:solidFill>
                   <a:schemeClr val="tx1"/>
                 </a:solidFill>
               </a:rPr>
-              <a:t>Público</a:t>
-            </a:r>
-            <a:endParaRPr lang="en-US" dirty="0">
-              <a:solidFill>
-                <a:schemeClr val="tx1"/>
-              </a:solidFill>
-            </a:endParaRPr>
+              <a:t>public</a:t>
+            </a:r>
           </a:p>
           <a:p>
             <a:pPr algn="ctr"/>
             <a:r>
-              <a:rPr lang="en-US" dirty="0" err="1">
-                <a:solidFill>
-                  <a:schemeClr val="tx1"/>
+              <a:rPr lang="en-US" dirty="0">
+                <a:solidFill>
+                  <a:schemeClr val="bg1">
+                    <a:lumMod val="85000"/>
+                  </a:schemeClr>
                 </a:solidFill>
               </a:rPr>
-              <a:t>Privado</a:t>
-            </a:r>
-            <a:endParaRPr lang="en-US" dirty="0">
-              <a:solidFill>
-                <a:schemeClr val="tx1"/>
-              </a:solidFill>
-            </a:endParaRPr>
+              <a:t>private</a:t>
+            </a:r>
           </a:p>
           <a:p>
             <a:pPr algn="ctr"/>
             <a:r>
-              <a:rPr lang="en-US" dirty="0" err="1">
-                <a:solidFill>
-                  <a:schemeClr val="tx1"/>
+              <a:rPr lang="en-US" dirty="0">
+                <a:solidFill>
+                  <a:schemeClr val="bg1">
+                    <a:lumMod val="85000"/>
+                  </a:schemeClr>
                 </a:solidFill>
               </a:rPr>
-              <a:t>Protegido</a:t>
+              <a:t>protected</a:t>
             </a:r>
             <a:endParaRPr lang="es-CO" dirty="0">
               <a:solidFill>
-                <a:schemeClr val="tx1"/>
+                <a:schemeClr val="bg1">
+                  <a:lumMod val="85000"/>
+                </a:schemeClr>
               </a:solidFill>
             </a:endParaRPr>
           </a:p>
@@ -4368,16 +4721,21 @@
         </p:nvSpPr>
         <p:spPr>
           <a:xfrm>
-            <a:off x="2589572" y="1742688"/>
+            <a:off x="2589572" y="1729625"/>
             <a:ext cx="1702676" cy="764024"/>
           </a:xfrm>
           <a:prstGeom prst="wedgeRectCallout">
             <a:avLst>
-              <a:gd name="adj1" fmla="val -20833"/>
-              <a:gd name="adj2" fmla="val 111393"/>
+              <a:gd name="adj1" fmla="val -41547"/>
+              <a:gd name="adj2" fmla="val 123361"/>
             </a:avLst>
           </a:prstGeom>
           <a:noFill/>
+          <a:ln w="38100">
+            <a:solidFill>
+              <a:srgbClr val="00B050"/>
+            </a:solidFill>
+          </a:ln>
         </p:spPr>
         <p:style>
           <a:lnRef idx="2">
@@ -4401,64 +4759,31 @@
           <a:p>
             <a:pPr algn="ctr"/>
             <a:r>
+              <a:rPr lang="en-US" b="1" dirty="0">
+                <a:solidFill>
+                  <a:schemeClr val="tx1"/>
+                </a:solidFill>
+              </a:rPr>
+              <a:t>static</a:t>
+            </a:r>
+          </a:p>
+          <a:p>
+            <a:pPr algn="ctr"/>
+            <a:r>
               <a:rPr lang="en-US" dirty="0">
                 <a:solidFill>
-                  <a:schemeClr val="tx1"/>
+                  <a:schemeClr val="bg1">
+                    <a:lumMod val="85000"/>
+                  </a:schemeClr>
                 </a:solidFill>
               </a:rPr>
-              <a:t>Final, </a:t>
-            </a:r>
-            <a:r>
-              <a:rPr lang="en-US" dirty="0" err="1">
-                <a:solidFill>
-                  <a:schemeClr val="tx1"/>
-                </a:solidFill>
-              </a:rPr>
-              <a:t>instanciar</a:t>
-            </a:r>
-            <a:endParaRPr lang="en-US" dirty="0">
-              <a:solidFill>
-                <a:schemeClr val="tx1"/>
-              </a:solidFill>
-            </a:endParaRPr>
-          </a:p>
-          <a:p>
-            <a:pPr algn="ctr"/>
-            <a:r>
-              <a:rPr lang="en-US" dirty="0">
-                <a:solidFill>
-                  <a:schemeClr val="tx1"/>
-                </a:solidFill>
-              </a:rPr>
-              <a:t>Static, no </a:t>
-            </a:r>
-            <a:r>
-              <a:rPr lang="en-US" dirty="0" err="1">
-                <a:solidFill>
-                  <a:schemeClr val="tx1"/>
-                </a:solidFill>
-              </a:rPr>
-              <a:t>crea</a:t>
-            </a:r>
-            <a:r>
-              <a:rPr lang="en-US" dirty="0">
-                <a:solidFill>
-                  <a:schemeClr val="tx1"/>
-                </a:solidFill>
-              </a:rPr>
-              <a:t> </a:t>
-            </a:r>
-            <a:r>
-              <a:rPr lang="en-US" dirty="0" err="1">
-                <a:solidFill>
-                  <a:schemeClr val="tx1"/>
-                </a:solidFill>
-              </a:rPr>
-              <a:t>instanacia</a:t>
+              <a:t>Final</a:t>
             </a:r>
             <a:endParaRPr lang="es-CO" dirty="0">
               <a:solidFill>
-                <a:schemeClr val="tx1"/>
+                <a:schemeClr val="bg1">
+                  <a:lumMod val="85000"/>
+                </a:schemeClr>
               </a:solidFill>
             </a:endParaRPr>
           </a:p>
@@ -4478,16 +4803,21 @@
         </p:nvSpPr>
         <p:spPr>
           <a:xfrm>
-            <a:off x="4359337" y="1557747"/>
+            <a:off x="4343269" y="1537800"/>
             <a:ext cx="1702676" cy="764024"/>
           </a:xfrm>
           <a:prstGeom prst="wedgeRectCallout">
             <a:avLst>
-              <a:gd name="adj1" fmla="val -40277"/>
-              <a:gd name="adj2" fmla="val 129964"/>
+              <a:gd name="adj1" fmla="val -90912"/>
+              <a:gd name="adj2" fmla="val 159030"/>
             </a:avLst>
           </a:prstGeom>
           <a:noFill/>
+          <a:ln w="38100">
+            <a:solidFill>
+              <a:schemeClr val="accent1"/>
+            </a:solidFill>
+          </a:ln>
         </p:spPr>
         <p:style>
           <a:lnRef idx="2">
@@ -4573,7 +4903,7 @@
         <p:spPr>
           <a:xfrm>
             <a:off x="9048179" y="1736931"/>
-            <a:ext cx="1702676" cy="764024"/>
+            <a:ext cx="1702676" cy="756718"/>
           </a:xfrm>
           <a:prstGeom prst="wedgeRectCallout">
             <a:avLst>
@@ -4582,6 +4912,11 @@
             </a:avLst>
           </a:prstGeom>
           <a:noFill/>
+          <a:ln w="38100">
+            <a:solidFill>
+              <a:srgbClr val="00FFFF"/>
+            </a:solidFill>
+          </a:ln>
         </p:spPr>
         <p:style>
           <a:lnRef idx="2">
@@ -4626,7 +4961,7 @@
                   <a:schemeClr val="tx1"/>
                 </a:solidFill>
               </a:rPr>
-              <a:t>subrutina</a:t>
+              <a:t>función</a:t>
             </a:r>
             <a:endParaRPr lang="es-CO" dirty="0">
               <a:solidFill>
@@ -4650,16 +4985,21 @@
         </p:nvSpPr>
         <p:spPr>
           <a:xfrm>
-            <a:off x="6364012" y="1592002"/>
-            <a:ext cx="1702676" cy="764024"/>
+            <a:off x="6364012" y="1595069"/>
+            <a:ext cx="2348914" cy="764024"/>
           </a:xfrm>
           <a:prstGeom prst="wedgeRectCallout">
             <a:avLst>
-              <a:gd name="adj1" fmla="val -40277"/>
-              <a:gd name="adj2" fmla="val 129964"/>
+              <a:gd name="adj1" fmla="val -103187"/>
+              <a:gd name="adj2" fmla="val 147061"/>
             </a:avLst>
           </a:prstGeom>
           <a:noFill/>
+          <a:ln w="38100">
+            <a:solidFill>
+              <a:schemeClr val="accent2"/>
+            </a:solidFill>
+          </a:ln>
         </p:spPr>
         <p:style>
           <a:lnRef idx="2">
@@ -4730,20 +5070,1191 @@
               </a:rPr>
               <a:t>hace</a:t>
             </a:r>
+            <a:r>
+              <a:rPr lang="en-US" dirty="0">
+                <a:solidFill>
+                  <a:schemeClr val="tx1"/>
+                </a:solidFill>
+              </a:rPr>
+              <a:t> (</a:t>
+            </a:r>
+            <a:r>
+              <a:rPr lang="en-US" dirty="0" err="1">
+                <a:solidFill>
+                  <a:schemeClr val="tx1"/>
+                </a:solidFill>
+              </a:rPr>
+              <a:t>comienza</a:t>
+            </a:r>
+            <a:r>
+              <a:rPr lang="en-US" dirty="0">
+                <a:solidFill>
+                  <a:schemeClr val="tx1"/>
+                </a:solidFill>
+              </a:rPr>
+              <a:t> con verbo </a:t>
+            </a:r>
+            <a:r>
+              <a:rPr lang="en-US" dirty="0" err="1">
+                <a:solidFill>
+                  <a:schemeClr val="tx1"/>
+                </a:solidFill>
+              </a:rPr>
+              <a:t>en</a:t>
+            </a:r>
+            <a:r>
+              <a:rPr lang="en-US" dirty="0">
+                <a:solidFill>
+                  <a:schemeClr val="tx1"/>
+                </a:solidFill>
+              </a:rPr>
+              <a:t> </a:t>
+            </a:r>
+            <a:r>
+              <a:rPr lang="en-US" dirty="0" err="1">
+                <a:solidFill>
+                  <a:schemeClr val="tx1"/>
+                </a:solidFill>
+              </a:rPr>
+              <a:t>infinitivo</a:t>
+            </a:r>
+            <a:r>
+              <a:rPr lang="en-US" dirty="0">
+                <a:solidFill>
+                  <a:schemeClr val="tx1"/>
+                </a:solidFill>
+              </a:rPr>
+              <a:t>)</a:t>
+            </a:r>
+          </a:p>
+        </p:txBody>
+      </p:sp>
+      <p:sp>
+        <p:nvSpPr>
+          <p:cNvPr id="7" name="CuadroTexto 6">
+            <a:extLst>
+              <a:ext uri="{FF2B5EF4-FFF2-40B4-BE49-F238E27FC236}">
+                <a16:creationId xmlns:a16="http://schemas.microsoft.com/office/drawing/2014/main" id="{7908272A-2432-47D6-886B-5BDBC956FB4C}"/>
+              </a:ext>
+            </a:extLst>
+          </p:cNvPr>
+          <p:cNvSpPr txBox="1"/>
+          <p:nvPr/>
+        </p:nvSpPr>
+        <p:spPr>
+          <a:xfrm>
+            <a:off x="9601200" y="4234593"/>
+            <a:ext cx="3527697" cy="2585323"/>
+          </a:xfrm>
+          <a:prstGeom prst="rect">
+            <a:avLst/>
+          </a:prstGeom>
+        </p:spPr>
+        <p:style>
+          <a:lnRef idx="3">
+            <a:schemeClr val="lt1"/>
+          </a:lnRef>
+          <a:fillRef idx="1">
+            <a:schemeClr val="accent3"/>
+          </a:fillRef>
+          <a:effectRef idx="1">
+            <a:schemeClr val="accent3"/>
+          </a:effectRef>
+          <a:fontRef idx="minor">
+            <a:schemeClr val="lt1"/>
+          </a:fontRef>
+        </p:style>
+        <p:txBody>
+          <a:bodyPr wrap="square" rtlCol="0">
+            <a:spAutoFit/>
+          </a:bodyPr>
+          <a:lstStyle/>
+          <a:p>
+            <a:pPr algn="ctr"/>
+            <a:r>
+              <a:rPr lang="en-US" dirty="0" err="1">
+                <a:solidFill>
+                  <a:schemeClr val="bg1"/>
+                </a:solidFill>
+              </a:rPr>
+              <a:t>En</a:t>
+            </a:r>
+            <a:r>
+              <a:rPr lang="en-US" dirty="0">
+                <a:solidFill>
+                  <a:schemeClr val="bg1"/>
+                </a:solidFill>
+              </a:rPr>
+              <a:t> una </a:t>
+            </a:r>
+            <a:r>
+              <a:rPr lang="en-US" dirty="0" err="1">
+                <a:solidFill>
+                  <a:schemeClr val="bg1"/>
+                </a:solidFill>
+              </a:rPr>
+              <a:t>función</a:t>
+            </a:r>
+            <a:r>
+              <a:rPr lang="en-US" dirty="0">
+                <a:solidFill>
+                  <a:schemeClr val="bg1"/>
+                </a:solidFill>
+              </a:rPr>
+              <a:t> </a:t>
+            </a:r>
+            <a:r>
+              <a:rPr lang="en-US" dirty="0" err="1">
+                <a:solidFill>
+                  <a:schemeClr val="bg1"/>
+                </a:solidFill>
+              </a:rPr>
+              <a:t>retorna</a:t>
+            </a:r>
+            <a:r>
+              <a:rPr lang="en-US" dirty="0">
+                <a:solidFill>
+                  <a:schemeClr val="bg1"/>
+                </a:solidFill>
+              </a:rPr>
+              <a:t> un valor del </a:t>
+            </a:r>
+            <a:r>
+              <a:rPr lang="en-US" dirty="0" err="1">
+                <a:solidFill>
+                  <a:schemeClr val="bg1"/>
+                </a:solidFill>
+              </a:rPr>
+              <a:t>mismo</a:t>
+            </a:r>
+            <a:r>
+              <a:rPr lang="en-US" dirty="0">
+                <a:solidFill>
+                  <a:schemeClr val="bg1"/>
+                </a:solidFill>
+              </a:rPr>
+              <a:t> </a:t>
+            </a:r>
+            <a:r>
+              <a:rPr lang="en-US" dirty="0" err="1">
+                <a:solidFill>
+                  <a:schemeClr val="bg1"/>
+                </a:solidFill>
+              </a:rPr>
+              <a:t>tipo</a:t>
+            </a:r>
+            <a:r>
+              <a:rPr lang="en-US" dirty="0">
+                <a:solidFill>
+                  <a:schemeClr val="bg1"/>
+                </a:solidFill>
+              </a:rPr>
+              <a:t> de la </a:t>
+            </a:r>
+            <a:r>
+              <a:rPr lang="en-US" dirty="0" err="1">
+                <a:solidFill>
+                  <a:schemeClr val="bg1"/>
+                </a:solidFill>
+              </a:rPr>
+              <a:t>función</a:t>
+            </a:r>
+            <a:r>
+              <a:rPr lang="en-US" dirty="0">
+                <a:solidFill>
+                  <a:schemeClr val="bg1"/>
+                </a:solidFill>
+              </a:rPr>
+              <a:t>.</a:t>
+            </a:r>
+          </a:p>
+          <a:p>
+            <a:pPr algn="ctr"/>
+            <a:endParaRPr lang="en-US" dirty="0">
+              <a:solidFill>
+                <a:schemeClr val="bg1"/>
+              </a:solidFill>
+            </a:endParaRPr>
+          </a:p>
+          <a:p>
+            <a:pPr algn="ctr"/>
+            <a:r>
+              <a:rPr lang="en-US" dirty="0">
+                <a:solidFill>
+                  <a:schemeClr val="bg1"/>
+                </a:solidFill>
+              </a:rPr>
+              <a:t>Debe </a:t>
+            </a:r>
+            <a:r>
+              <a:rPr lang="en-US" dirty="0" err="1">
+                <a:solidFill>
+                  <a:schemeClr val="bg1"/>
+                </a:solidFill>
+              </a:rPr>
+              <a:t>retornar</a:t>
+            </a:r>
+            <a:r>
+              <a:rPr lang="en-US" dirty="0">
+                <a:solidFill>
+                  <a:schemeClr val="bg1"/>
+                </a:solidFill>
+              </a:rPr>
+              <a:t> por ambos </a:t>
+            </a:r>
+            <a:r>
+              <a:rPr lang="en-US" dirty="0" err="1">
+                <a:solidFill>
+                  <a:schemeClr val="bg1"/>
+                </a:solidFill>
+              </a:rPr>
+              <a:t>bloques</a:t>
+            </a:r>
+            <a:r>
+              <a:rPr lang="en-US" dirty="0">
+                <a:solidFill>
+                  <a:schemeClr val="bg1"/>
+                </a:solidFill>
+              </a:rPr>
+              <a:t> del control de </a:t>
+            </a:r>
+            <a:r>
+              <a:rPr lang="en-US" dirty="0" err="1">
+                <a:solidFill>
+                  <a:schemeClr val="bg1"/>
+                </a:solidFill>
+              </a:rPr>
+              <a:t>errores</a:t>
+            </a:r>
+            <a:endParaRPr lang="en-US" dirty="0">
+              <a:solidFill>
+                <a:schemeClr val="bg1"/>
+              </a:solidFill>
+            </a:endParaRPr>
+          </a:p>
+          <a:p>
+            <a:pPr algn="ctr"/>
+            <a:endParaRPr lang="en-US" dirty="0">
+              <a:solidFill>
+                <a:schemeClr val="bg1"/>
+              </a:solidFill>
+            </a:endParaRPr>
+          </a:p>
+          <a:p>
+            <a:pPr algn="ctr"/>
+            <a:r>
+              <a:rPr lang="en-US" dirty="0">
+                <a:solidFill>
+                  <a:schemeClr val="bg1"/>
+                </a:solidFill>
+              </a:rPr>
+              <a:t>Las </a:t>
+            </a:r>
+            <a:r>
+              <a:rPr lang="en-US" dirty="0" err="1">
+                <a:solidFill>
+                  <a:schemeClr val="bg1"/>
+                </a:solidFill>
+              </a:rPr>
+              <a:t>instrucciones</a:t>
+            </a:r>
+            <a:r>
+              <a:rPr lang="en-US" dirty="0">
+                <a:solidFill>
+                  <a:schemeClr val="bg1"/>
+                </a:solidFill>
+              </a:rPr>
+              <a:t> que van </a:t>
+            </a:r>
+            <a:r>
+              <a:rPr lang="en-US" dirty="0" err="1">
+                <a:solidFill>
+                  <a:schemeClr val="bg1"/>
+                </a:solidFill>
+              </a:rPr>
+              <a:t>luego</a:t>
+            </a:r>
+            <a:r>
+              <a:rPr lang="en-US" dirty="0">
+                <a:solidFill>
+                  <a:schemeClr val="bg1"/>
+                </a:solidFill>
+              </a:rPr>
+              <a:t> de un return, no se </a:t>
+            </a:r>
+            <a:r>
+              <a:rPr lang="en-US" dirty="0" err="1">
+                <a:solidFill>
+                  <a:schemeClr val="bg1"/>
+                </a:solidFill>
+              </a:rPr>
+              <a:t>ejecutan</a:t>
+            </a:r>
             <a:endParaRPr lang="es-CO" dirty="0">
               <a:solidFill>
-                <a:schemeClr val="tx1"/>
+                <a:schemeClr val="bg1"/>
               </a:solidFill>
             </a:endParaRPr>
           </a:p>
-        </p:txBody>
-      </p:sp>
-      <p:sp>
-        <p:nvSpPr>
-          <p:cNvPr id="10" name="Bocadillo: rectángulo 9">
+          <a:p>
+            <a:endParaRPr lang="es-CO" dirty="0"/>
+          </a:p>
+        </p:txBody>
+      </p:sp>
+      <p:cxnSp>
+        <p:nvCxnSpPr>
+          <p:cNvPr id="12" name="Conector recto de flecha 11">
             <a:extLst>
               <a:ext uri="{FF2B5EF4-FFF2-40B4-BE49-F238E27FC236}">
-                <a16:creationId xmlns:a16="http://schemas.microsoft.com/office/drawing/2014/main" id="{D9398874-116D-406D-815F-997675AC34F4}"/>
+                <a16:creationId xmlns:a16="http://schemas.microsoft.com/office/drawing/2014/main" id="{8AB42BDF-C322-4436-AAA6-5F22EC708CE3}"/>
+              </a:ext>
+            </a:extLst>
+          </p:cNvPr>
+          <p:cNvCxnSpPr>
+            <a:cxnSpLocks/>
+          </p:cNvCxnSpPr>
+          <p:nvPr/>
+        </p:nvCxnSpPr>
+        <p:spPr>
+          <a:xfrm flipH="1" flipV="1">
+            <a:off x="7302137" y="4715691"/>
+            <a:ext cx="2299064" cy="522514"/>
+          </a:xfrm>
+          <a:prstGeom prst="straightConnector1">
+            <a:avLst/>
+          </a:prstGeom>
+          <a:ln>
+            <a:tailEnd type="triangle"/>
+          </a:ln>
+        </p:spPr>
+        <p:style>
+          <a:lnRef idx="1">
+            <a:schemeClr val="accent1"/>
+          </a:lnRef>
+          <a:fillRef idx="0">
+            <a:schemeClr val="accent1"/>
+          </a:fillRef>
+          <a:effectRef idx="0">
+            <a:schemeClr val="accent1"/>
+          </a:effectRef>
+          <a:fontRef idx="minor">
+            <a:schemeClr val="tx1"/>
+          </a:fontRef>
+        </p:style>
+      </p:cxnSp>
+      <p:cxnSp>
+        <p:nvCxnSpPr>
+          <p:cNvPr id="15" name="Conector recto de flecha 14">
+            <a:extLst>
+              <a:ext uri="{FF2B5EF4-FFF2-40B4-BE49-F238E27FC236}">
+                <a16:creationId xmlns:a16="http://schemas.microsoft.com/office/drawing/2014/main" id="{F3B9460D-4D06-4E76-8541-428B41D35EEC}"/>
+              </a:ext>
+            </a:extLst>
+          </p:cNvPr>
+          <p:cNvCxnSpPr>
+            <a:cxnSpLocks/>
+          </p:cNvCxnSpPr>
+          <p:nvPr/>
+        </p:nvCxnSpPr>
+        <p:spPr>
+          <a:xfrm flipH="1">
+            <a:off x="7302137" y="5394960"/>
+            <a:ext cx="2299062" cy="783771"/>
+          </a:xfrm>
+          <a:prstGeom prst="straightConnector1">
+            <a:avLst/>
+          </a:prstGeom>
+          <a:ln>
+            <a:tailEnd type="triangle"/>
+          </a:ln>
+        </p:spPr>
+        <p:style>
+          <a:lnRef idx="1">
+            <a:schemeClr val="accent1"/>
+          </a:lnRef>
+          <a:fillRef idx="0">
+            <a:schemeClr val="accent1"/>
+          </a:fillRef>
+          <a:effectRef idx="0">
+            <a:schemeClr val="accent1"/>
+          </a:effectRef>
+          <a:fontRef idx="minor">
+            <a:schemeClr val="tx1"/>
+          </a:fontRef>
+        </p:style>
+      </p:cxnSp>
+    </p:spTree>
+    <p:extLst>
+      <p:ext uri="{BB962C8B-B14F-4D97-AF65-F5344CB8AC3E}">
+        <p14:creationId xmlns:p14="http://schemas.microsoft.com/office/powerpoint/2010/main" val="3794522921"/>
+      </p:ext>
+    </p:extLst>
+  </p:cSld>
+  <p:clrMapOvr>
+    <a:masterClrMapping/>
+  </p:clrMapOvr>
+</p:sld>
+</file>
+
+<file path=ppt/slides/slide11.xml><?xml version="1.0" encoding="utf-8"?>
+<p:sld xmlns:a="http://schemas.openxmlformats.org/drawingml/2006/main" xmlns:r="http://schemas.openxmlformats.org/officeDocument/2006/relationships" xmlns:p="http://schemas.openxmlformats.org/presentationml/2006/main">
+  <p:cSld>
+    <p:spTree>
+      <p:nvGrpSpPr>
+        <p:cNvPr id="1" name=""/>
+        <p:cNvGrpSpPr/>
+        <p:nvPr/>
+      </p:nvGrpSpPr>
+      <p:grpSpPr>
+        <a:xfrm>
+          <a:off x="0" y="0"/>
+          <a:ext cx="0" cy="0"/>
+          <a:chOff x="0" y="0"/>
+          <a:chExt cx="0" cy="0"/>
+        </a:xfrm>
+      </p:grpSpPr>
+      <p:sp>
+        <p:nvSpPr>
+          <p:cNvPr id="2" name="Título 1">
+            <a:extLst>
+              <a:ext uri="{FF2B5EF4-FFF2-40B4-BE49-F238E27FC236}">
+                <a16:creationId xmlns:a16="http://schemas.microsoft.com/office/drawing/2014/main" id="{2C5C3021-36BB-4F4D-A4B1-10E2987AE81B}"/>
+              </a:ext>
+            </a:extLst>
+          </p:cNvPr>
+          <p:cNvSpPr>
+            <a:spLocks noGrp="1"/>
+          </p:cNvSpPr>
+          <p:nvPr>
+            <p:ph type="title"/>
+          </p:nvPr>
+        </p:nvSpPr>
+        <p:spPr/>
+        <p:txBody>
+          <a:bodyPr/>
+          <a:lstStyle/>
+          <a:p>
+            <a:r>
+              <a:rPr lang="es-ES" dirty="0"/>
+              <a:t>Ejemplos Definiciones</a:t>
+            </a:r>
+            <a:endParaRPr lang="es-CO" dirty="0"/>
+          </a:p>
+        </p:txBody>
+      </p:sp>
+      <p:sp>
+        <p:nvSpPr>
+          <p:cNvPr id="5" name="CuadroTexto 4">
+            <a:extLst>
+              <a:ext uri="{FF2B5EF4-FFF2-40B4-BE49-F238E27FC236}">
+                <a16:creationId xmlns:a16="http://schemas.microsoft.com/office/drawing/2014/main" id="{EB58747B-A0A4-4D28-8C08-DBAC551BFEB2}"/>
+              </a:ext>
+            </a:extLst>
+          </p:cNvPr>
+          <p:cNvSpPr txBox="1"/>
+          <p:nvPr/>
+        </p:nvSpPr>
+        <p:spPr>
+          <a:xfrm>
+            <a:off x="682905" y="2309654"/>
+            <a:ext cx="11725155" cy="646331"/>
+          </a:xfrm>
+          <a:prstGeom prst="rect">
+            <a:avLst/>
+          </a:prstGeom>
+          <a:noFill/>
+        </p:spPr>
+        <p:txBody>
+          <a:bodyPr wrap="square">
+            <a:spAutoFit/>
+          </a:bodyPr>
+          <a:lstStyle/>
+          <a:p>
+            <a:r>
+              <a:rPr lang="es-ES" b="0" dirty="0">
+                <a:solidFill>
+                  <a:srgbClr val="6A9955"/>
+                </a:solidFill>
+                <a:effectLst/>
+              </a:rPr>
+              <a:t>1. Define la función </a:t>
+            </a:r>
+            <a:r>
+              <a:rPr lang="es-ES" b="0" dirty="0" err="1">
+                <a:solidFill>
+                  <a:srgbClr val="6A9955"/>
+                </a:solidFill>
+                <a:effectLst/>
+              </a:rPr>
+              <a:t>Convertir_min_sec</a:t>
+            </a:r>
+            <a:r>
+              <a:rPr lang="es-ES" b="0" dirty="0">
+                <a:solidFill>
+                  <a:srgbClr val="6A9955"/>
+                </a:solidFill>
+                <a:effectLst/>
+              </a:rPr>
+              <a:t> que recibe un número entero en minutos y devuelve en entero, los segundos equivalentes. </a:t>
+            </a:r>
+          </a:p>
+        </p:txBody>
+      </p:sp>
+      <p:sp>
+        <p:nvSpPr>
+          <p:cNvPr id="7" name="CuadroTexto 6">
+            <a:extLst>
+              <a:ext uri="{FF2B5EF4-FFF2-40B4-BE49-F238E27FC236}">
+                <a16:creationId xmlns:a16="http://schemas.microsoft.com/office/drawing/2014/main" id="{DDDB331B-A30D-4302-AC12-5F4C2ED4E72C}"/>
+              </a:ext>
+            </a:extLst>
+          </p:cNvPr>
+          <p:cNvSpPr txBox="1"/>
+          <p:nvPr/>
+        </p:nvSpPr>
+        <p:spPr>
+          <a:xfrm>
+            <a:off x="682905" y="3659716"/>
+            <a:ext cx="11917680" cy="369332"/>
+          </a:xfrm>
+          <a:prstGeom prst="rect">
+            <a:avLst/>
+          </a:prstGeom>
+          <a:noFill/>
+        </p:spPr>
+        <p:txBody>
+          <a:bodyPr wrap="square">
+            <a:spAutoFit/>
+          </a:bodyPr>
+          <a:lstStyle>
+            <a:defPPr>
+              <a:defRPr lang="en-US"/>
+            </a:defPPr>
+            <a:lvl1pPr>
+              <a:defRPr b="0">
+                <a:solidFill>
+                  <a:srgbClr val="6A9955"/>
+                </a:solidFill>
+                <a:effectLst/>
+              </a:defRPr>
+            </a:lvl1pPr>
+          </a:lstStyle>
+          <a:p>
+            <a:r>
+              <a:rPr lang="es-ES" dirty="0"/>
+              <a:t>2. Define la función </a:t>
+            </a:r>
+            <a:r>
+              <a:rPr lang="es-ES" dirty="0" err="1"/>
+              <a:t>Validar_iguales</a:t>
+            </a:r>
+            <a:r>
+              <a:rPr lang="es-ES" dirty="0"/>
+              <a:t> que recibe dos números shorts  y devuelve un booleano</a:t>
+            </a:r>
+          </a:p>
+        </p:txBody>
+      </p:sp>
+      <p:sp>
+        <p:nvSpPr>
+          <p:cNvPr id="9" name="CuadroTexto 8">
+            <a:extLst>
+              <a:ext uri="{FF2B5EF4-FFF2-40B4-BE49-F238E27FC236}">
+                <a16:creationId xmlns:a16="http://schemas.microsoft.com/office/drawing/2014/main" id="{575F2964-7A12-496B-823A-518678AFAEE3}"/>
+              </a:ext>
+            </a:extLst>
+          </p:cNvPr>
+          <p:cNvSpPr txBox="1"/>
+          <p:nvPr/>
+        </p:nvSpPr>
+        <p:spPr>
+          <a:xfrm>
+            <a:off x="682905" y="5126319"/>
+            <a:ext cx="11917680" cy="646331"/>
+          </a:xfrm>
+          <a:prstGeom prst="rect">
+            <a:avLst/>
+          </a:prstGeom>
+          <a:noFill/>
+        </p:spPr>
+        <p:txBody>
+          <a:bodyPr wrap="square">
+            <a:spAutoFit/>
+          </a:bodyPr>
+          <a:lstStyle>
+            <a:defPPr>
+              <a:defRPr lang="en-US"/>
+            </a:defPPr>
+            <a:lvl1pPr>
+              <a:defRPr b="0">
+                <a:solidFill>
+                  <a:srgbClr val="6A9955"/>
+                </a:solidFill>
+                <a:effectLst/>
+              </a:defRPr>
+            </a:lvl1pPr>
+          </a:lstStyle>
+          <a:p>
+            <a:r>
+              <a:rPr lang="es-ES" dirty="0"/>
+              <a:t>3. Define la función </a:t>
+            </a:r>
+            <a:r>
+              <a:rPr lang="es-ES" dirty="0" err="1"/>
+              <a:t>Calcular_potencia</a:t>
+            </a:r>
+            <a:r>
+              <a:rPr lang="es-ES" dirty="0"/>
+              <a:t> que recibe en un short el voltaje y en un byte, la corriente. Devuelve la potencia en un </a:t>
+            </a:r>
+            <a:r>
+              <a:rPr lang="es-ES" dirty="0" err="1"/>
+              <a:t>float</a:t>
+            </a:r>
+            <a:r>
+              <a:rPr lang="es-ES" dirty="0"/>
+              <a:t>. </a:t>
+            </a:r>
+          </a:p>
+        </p:txBody>
+      </p:sp>
+      <p:sp>
+        <p:nvSpPr>
+          <p:cNvPr id="11" name="CuadroTexto 10">
+            <a:extLst>
+              <a:ext uri="{FF2B5EF4-FFF2-40B4-BE49-F238E27FC236}">
+                <a16:creationId xmlns:a16="http://schemas.microsoft.com/office/drawing/2014/main" id="{11C2F71C-C6B6-4AA2-9580-593FB99EE62A}"/>
+              </a:ext>
+            </a:extLst>
+          </p:cNvPr>
+          <p:cNvSpPr txBox="1"/>
+          <p:nvPr/>
+        </p:nvSpPr>
+        <p:spPr>
+          <a:xfrm>
+            <a:off x="2725839" y="2955985"/>
+            <a:ext cx="6910086" cy="461665"/>
+          </a:xfrm>
+          <a:prstGeom prst="rect">
+            <a:avLst/>
+          </a:prstGeom>
+          <a:noFill/>
+        </p:spPr>
+        <p:txBody>
+          <a:bodyPr wrap="square">
+            <a:spAutoFit/>
+          </a:bodyPr>
+          <a:lstStyle/>
+          <a:p>
+            <a:r>
+              <a:rPr lang="es-CO" sz="2400" b="1" dirty="0" err="1">
+                <a:solidFill>
+                  <a:schemeClr val="accent2"/>
+                </a:solidFill>
+              </a:rPr>
+              <a:t>public</a:t>
+            </a:r>
+            <a:r>
+              <a:rPr lang="es-CO" sz="2400" b="1" dirty="0">
+                <a:solidFill>
+                  <a:schemeClr val="accent2"/>
+                </a:solidFill>
+              </a:rPr>
+              <a:t> </a:t>
+            </a:r>
+            <a:r>
+              <a:rPr lang="es-CO" sz="2400" b="1" dirty="0" err="1">
+                <a:solidFill>
+                  <a:schemeClr val="accent2"/>
+                </a:solidFill>
+              </a:rPr>
+              <a:t>static</a:t>
+            </a:r>
+            <a:r>
+              <a:rPr lang="es-CO" sz="2400" b="1" dirty="0">
+                <a:solidFill>
+                  <a:schemeClr val="accent2"/>
+                </a:solidFill>
+              </a:rPr>
+              <a:t> </a:t>
+            </a:r>
+            <a:r>
+              <a:rPr lang="es-CO" sz="2400" b="1" dirty="0" err="1">
+                <a:solidFill>
+                  <a:schemeClr val="accent2"/>
+                </a:solidFill>
+              </a:rPr>
+              <a:t>int</a:t>
+            </a:r>
+            <a:r>
+              <a:rPr lang="es-CO" sz="2400" b="1" dirty="0">
+                <a:solidFill>
+                  <a:schemeClr val="accent2"/>
+                </a:solidFill>
+              </a:rPr>
+              <a:t> </a:t>
+            </a:r>
+            <a:r>
+              <a:rPr lang="es-CO" sz="2400" b="1" dirty="0" err="1">
+                <a:solidFill>
+                  <a:schemeClr val="accent2"/>
+                </a:solidFill>
+              </a:rPr>
+              <a:t>Convertir_min_sec</a:t>
+            </a:r>
+            <a:r>
+              <a:rPr lang="es-CO" sz="2400" b="1" dirty="0">
+                <a:solidFill>
+                  <a:schemeClr val="accent2"/>
+                </a:solidFill>
+              </a:rPr>
+              <a:t>(</a:t>
+            </a:r>
+            <a:r>
+              <a:rPr lang="es-CO" sz="2400" b="1" dirty="0" err="1">
+                <a:solidFill>
+                  <a:schemeClr val="accent2"/>
+                </a:solidFill>
+              </a:rPr>
+              <a:t>int</a:t>
+            </a:r>
+            <a:r>
+              <a:rPr lang="es-CO" sz="2400" b="1" dirty="0">
+                <a:solidFill>
+                  <a:schemeClr val="accent2"/>
+                </a:solidFill>
+              </a:rPr>
+              <a:t> minutos)</a:t>
+            </a:r>
+          </a:p>
+        </p:txBody>
+      </p:sp>
+      <p:sp>
+        <p:nvSpPr>
+          <p:cNvPr id="13" name="CuadroTexto 12">
+            <a:extLst>
+              <a:ext uri="{FF2B5EF4-FFF2-40B4-BE49-F238E27FC236}">
+                <a16:creationId xmlns:a16="http://schemas.microsoft.com/office/drawing/2014/main" id="{C3825CF4-3C6D-40ED-93B9-91B6928195B6}"/>
+              </a:ext>
+            </a:extLst>
+          </p:cNvPr>
+          <p:cNvSpPr txBox="1"/>
+          <p:nvPr/>
+        </p:nvSpPr>
+        <p:spPr>
+          <a:xfrm>
+            <a:off x="2341621" y="4286205"/>
+            <a:ext cx="8407721" cy="461665"/>
+          </a:xfrm>
+          <a:prstGeom prst="rect">
+            <a:avLst/>
+          </a:prstGeom>
+          <a:noFill/>
+        </p:spPr>
+        <p:txBody>
+          <a:bodyPr wrap="square">
+            <a:spAutoFit/>
+          </a:bodyPr>
+          <a:lstStyle>
+            <a:defPPr>
+              <a:defRPr lang="en-US"/>
+            </a:defPPr>
+            <a:lvl1pPr>
+              <a:defRPr sz="2400" b="1"/>
+            </a:lvl1pPr>
+          </a:lstStyle>
+          <a:p>
+            <a:r>
+              <a:rPr lang="es-CO" dirty="0">
+                <a:solidFill>
+                  <a:schemeClr val="accent2"/>
+                </a:solidFill>
+              </a:rPr>
+              <a:t> </a:t>
+            </a:r>
+            <a:r>
+              <a:rPr lang="es-CO" dirty="0" err="1">
+                <a:solidFill>
+                  <a:schemeClr val="accent2"/>
+                </a:solidFill>
+              </a:rPr>
+              <a:t>public</a:t>
+            </a:r>
+            <a:r>
+              <a:rPr lang="es-CO" dirty="0">
+                <a:solidFill>
+                  <a:schemeClr val="accent2"/>
+                </a:solidFill>
+              </a:rPr>
+              <a:t> </a:t>
+            </a:r>
+            <a:r>
+              <a:rPr lang="es-CO" dirty="0" err="1">
+                <a:solidFill>
+                  <a:schemeClr val="accent2"/>
+                </a:solidFill>
+              </a:rPr>
+              <a:t>static</a:t>
+            </a:r>
+            <a:r>
+              <a:rPr lang="es-CO" dirty="0">
+                <a:solidFill>
+                  <a:schemeClr val="accent2"/>
+                </a:solidFill>
+              </a:rPr>
+              <a:t> </a:t>
+            </a:r>
+            <a:r>
+              <a:rPr lang="es-CO" dirty="0" err="1">
+                <a:solidFill>
+                  <a:schemeClr val="accent2"/>
+                </a:solidFill>
+              </a:rPr>
+              <a:t>boolean</a:t>
+            </a:r>
+            <a:r>
+              <a:rPr lang="es-CO" dirty="0">
+                <a:solidFill>
+                  <a:schemeClr val="accent2"/>
+                </a:solidFill>
+              </a:rPr>
+              <a:t> </a:t>
+            </a:r>
+            <a:r>
+              <a:rPr lang="es-CO" dirty="0" err="1">
+                <a:solidFill>
+                  <a:schemeClr val="accent2"/>
+                </a:solidFill>
+              </a:rPr>
+              <a:t>Validar_iguales</a:t>
+            </a:r>
+            <a:r>
+              <a:rPr lang="es-CO" dirty="0">
+                <a:solidFill>
+                  <a:schemeClr val="accent2"/>
+                </a:solidFill>
+              </a:rPr>
+              <a:t>(byte nro1, byte nro2)</a:t>
+            </a:r>
+          </a:p>
+        </p:txBody>
+      </p:sp>
+      <p:sp>
+        <p:nvSpPr>
+          <p:cNvPr id="15" name="CuadroTexto 14">
+            <a:extLst>
+              <a:ext uri="{FF2B5EF4-FFF2-40B4-BE49-F238E27FC236}">
+                <a16:creationId xmlns:a16="http://schemas.microsoft.com/office/drawing/2014/main" id="{7D6152DE-3307-45B2-ACAA-46BC19CFA1B6}"/>
+              </a:ext>
+            </a:extLst>
+          </p:cNvPr>
+          <p:cNvSpPr txBox="1"/>
+          <p:nvPr/>
+        </p:nvSpPr>
+        <p:spPr>
+          <a:xfrm>
+            <a:off x="2280213" y="6029807"/>
+            <a:ext cx="8918293" cy="461665"/>
+          </a:xfrm>
+          <a:prstGeom prst="rect">
+            <a:avLst/>
+          </a:prstGeom>
+          <a:noFill/>
+        </p:spPr>
+        <p:txBody>
+          <a:bodyPr wrap="square">
+            <a:spAutoFit/>
+          </a:bodyPr>
+          <a:lstStyle>
+            <a:defPPr>
+              <a:defRPr lang="en-US"/>
+            </a:defPPr>
+            <a:lvl1pPr>
+              <a:defRPr sz="2400" b="1"/>
+            </a:lvl1pPr>
+          </a:lstStyle>
+          <a:p>
+            <a:r>
+              <a:rPr lang="es-CO" dirty="0">
+                <a:solidFill>
+                  <a:schemeClr val="accent2"/>
+                </a:solidFill>
+              </a:rPr>
+              <a:t> </a:t>
+            </a:r>
+            <a:r>
+              <a:rPr lang="es-CO" dirty="0" err="1">
+                <a:solidFill>
+                  <a:schemeClr val="accent2"/>
+                </a:solidFill>
+              </a:rPr>
+              <a:t>public</a:t>
+            </a:r>
+            <a:r>
+              <a:rPr lang="es-CO" dirty="0">
+                <a:solidFill>
+                  <a:schemeClr val="accent2"/>
+                </a:solidFill>
+              </a:rPr>
+              <a:t> </a:t>
+            </a:r>
+            <a:r>
+              <a:rPr lang="es-CO" dirty="0" err="1">
+                <a:solidFill>
+                  <a:schemeClr val="accent2"/>
+                </a:solidFill>
+              </a:rPr>
+              <a:t>static</a:t>
+            </a:r>
+            <a:r>
+              <a:rPr lang="es-CO" dirty="0">
+                <a:solidFill>
+                  <a:schemeClr val="accent2"/>
+                </a:solidFill>
+              </a:rPr>
+              <a:t> </a:t>
+            </a:r>
+            <a:r>
+              <a:rPr lang="es-CO" dirty="0" err="1">
+                <a:solidFill>
+                  <a:schemeClr val="accent2"/>
+                </a:solidFill>
+              </a:rPr>
+              <a:t>float</a:t>
+            </a:r>
+            <a:r>
+              <a:rPr lang="es-CO" dirty="0">
+                <a:solidFill>
+                  <a:schemeClr val="accent2"/>
+                </a:solidFill>
+              </a:rPr>
+              <a:t> </a:t>
+            </a:r>
+            <a:r>
+              <a:rPr lang="es-CO" dirty="0" err="1">
+                <a:solidFill>
+                  <a:schemeClr val="accent2"/>
+                </a:solidFill>
+              </a:rPr>
+              <a:t>Calcular_potencia</a:t>
+            </a:r>
+            <a:r>
+              <a:rPr lang="es-CO" dirty="0">
+                <a:solidFill>
+                  <a:schemeClr val="accent2"/>
+                </a:solidFill>
+              </a:rPr>
+              <a:t>(short voltaje, byte corriente)</a:t>
+            </a:r>
+          </a:p>
+        </p:txBody>
+      </p:sp>
+    </p:spTree>
+    <p:extLst>
+      <p:ext uri="{BB962C8B-B14F-4D97-AF65-F5344CB8AC3E}">
+        <p14:creationId xmlns:p14="http://schemas.microsoft.com/office/powerpoint/2010/main" val="1374845394"/>
+      </p:ext>
+    </p:extLst>
+  </p:cSld>
+  <p:clrMapOvr>
+    <a:masterClrMapping/>
+  </p:clrMapOvr>
+  <p:timing>
+    <p:tnLst>
+      <p:par>
+        <p:cTn id="1" dur="indefinite" restart="never" nodeType="tmRoot">
+          <p:childTnLst>
+            <p:seq concurrent="1" nextAc="seek">
+              <p:cTn id="2" dur="indefinite" nodeType="mainSeq">
+                <p:childTnLst>
+                  <p:par>
+                    <p:cTn id="3" fill="hold">
+                      <p:stCondLst>
+                        <p:cond delay="indefinite"/>
+                      </p:stCondLst>
+                      <p:childTnLst>
+                        <p:par>
+                          <p:cTn id="4" fill="hold">
+                            <p:stCondLst>
+                              <p:cond delay="0"/>
+                            </p:stCondLst>
+                            <p:childTnLst>
+                              <p:par>
+                                <p:cTn id="5" presetID="1" presetClass="entr" presetSubtype="0" fill="hold" grpId="0" nodeType="clickEffect">
+                                  <p:stCondLst>
+                                    <p:cond delay="0"/>
+                                  </p:stCondLst>
+                                  <p:childTnLst>
+                                    <p:set>
+                                      <p:cBhvr>
+                                        <p:cTn id="6" dur="1" fill="hold">
+                                          <p:stCondLst>
+                                            <p:cond delay="0"/>
+                                          </p:stCondLst>
+                                        </p:cTn>
+                                        <p:tgtEl>
+                                          <p:spTgt spid="11"/>
+                                        </p:tgtEl>
+                                        <p:attrNameLst>
+                                          <p:attrName>style.visibility</p:attrName>
+                                        </p:attrNameLst>
+                                      </p:cBhvr>
+                                      <p:to>
+                                        <p:strVal val="visible"/>
+                                      </p:to>
+                                    </p:set>
+                                  </p:childTnLst>
+                                </p:cTn>
+                              </p:par>
+                            </p:childTnLst>
+                          </p:cTn>
+                        </p:par>
+                      </p:childTnLst>
+                    </p:cTn>
+                  </p:par>
+                  <p:par>
+                    <p:cTn id="7" fill="hold">
+                      <p:stCondLst>
+                        <p:cond delay="indefinite"/>
+                      </p:stCondLst>
+                      <p:childTnLst>
+                        <p:par>
+                          <p:cTn id="8" fill="hold">
+                            <p:stCondLst>
+                              <p:cond delay="0"/>
+                            </p:stCondLst>
+                            <p:childTnLst>
+                              <p:par>
+                                <p:cTn id="9" presetID="1" presetClass="entr" presetSubtype="0" fill="hold" grpId="0" nodeType="clickEffect">
+                                  <p:stCondLst>
+                                    <p:cond delay="0"/>
+                                  </p:stCondLst>
+                                  <p:childTnLst>
+                                    <p:set>
+                                      <p:cBhvr>
+                                        <p:cTn id="10" dur="1" fill="hold">
+                                          <p:stCondLst>
+                                            <p:cond delay="0"/>
+                                          </p:stCondLst>
+                                        </p:cTn>
+                                        <p:tgtEl>
+                                          <p:spTgt spid="13"/>
+                                        </p:tgtEl>
+                                        <p:attrNameLst>
+                                          <p:attrName>style.visibility</p:attrName>
+                                        </p:attrNameLst>
+                                      </p:cBhvr>
+                                      <p:to>
+                                        <p:strVal val="visible"/>
+                                      </p:to>
+                                    </p:set>
+                                  </p:childTnLst>
+                                </p:cTn>
+                              </p:par>
+                            </p:childTnLst>
+                          </p:cTn>
+                        </p:par>
+                      </p:childTnLst>
+                    </p:cTn>
+                  </p:par>
+                  <p:par>
+                    <p:cTn id="11" fill="hold">
+                      <p:stCondLst>
+                        <p:cond delay="indefinite"/>
+                      </p:stCondLst>
+                      <p:childTnLst>
+                        <p:par>
+                          <p:cTn id="12" fill="hold">
+                            <p:stCondLst>
+                              <p:cond delay="0"/>
+                            </p:stCondLst>
+                            <p:childTnLst>
+                              <p:par>
+                                <p:cTn id="13" presetID="1" presetClass="entr" presetSubtype="0" fill="hold" grpId="0" nodeType="clickEffect">
+                                  <p:stCondLst>
+                                    <p:cond delay="0"/>
+                                  </p:stCondLst>
+                                  <p:childTnLst>
+                                    <p:set>
+                                      <p:cBhvr>
+                                        <p:cTn id="14" dur="1" fill="hold">
+                                          <p:stCondLst>
+                                            <p:cond delay="0"/>
+                                          </p:stCondLst>
+                                        </p:cTn>
+                                        <p:tgtEl>
+                                          <p:spTgt spid="15"/>
+                                        </p:tgtEl>
+                                        <p:attrNameLst>
+                                          <p:attrName>style.visibility</p:attrName>
+                                        </p:attrNameLst>
+                                      </p:cBhvr>
+                                      <p:to>
+                                        <p:strVal val="visible"/>
+                                      </p:to>
+                                    </p:set>
+                                  </p:childTnLst>
+                                </p:cTn>
+                              </p:par>
+                            </p:childTnLst>
+                          </p:cTn>
+                        </p:par>
+                      </p:childTnLst>
+                    </p:cTn>
+                  </p:par>
+                </p:childTnLst>
+              </p:cTn>
+              <p:prevCondLst>
+                <p:cond evt="onPrev" delay="0">
+                  <p:tgtEl>
+                    <p:sldTgt/>
+                  </p:tgtEl>
+                </p:cond>
+              </p:prevCondLst>
+              <p:nextCondLst>
+                <p:cond evt="onNext" delay="0">
+                  <p:tgtEl>
+                    <p:sldTgt/>
+                  </p:tgtEl>
+                </p:cond>
+              </p:nextCondLst>
+            </p:seq>
+          </p:childTnLst>
+        </p:cTn>
+      </p:par>
+    </p:tnLst>
+    <p:bldLst>
+      <p:bldP spid="11" grpId="0"/>
+      <p:bldP spid="13" grpId="0"/>
+      <p:bldP spid="15" grpId="0"/>
+    </p:bldLst>
+  </p:timing>
+</p:sld>
+</file>
+
+<file path=ppt/slides/slide12.xml><?xml version="1.0" encoding="utf-8"?>
+<p:sld xmlns:a="http://schemas.openxmlformats.org/drawingml/2006/main" xmlns:r="http://schemas.openxmlformats.org/officeDocument/2006/relationships" xmlns:p="http://schemas.openxmlformats.org/presentationml/2006/main">
+  <p:cSld>
+    <p:spTree>
+      <p:nvGrpSpPr>
+        <p:cNvPr id="1" name=""/>
+        <p:cNvGrpSpPr/>
+        <p:nvPr/>
+      </p:nvGrpSpPr>
+      <p:grpSpPr>
+        <a:xfrm>
+          <a:off x="0" y="0"/>
+          <a:ext cx="0" cy="0"/>
+          <a:chOff x="0" y="0"/>
+          <a:chExt cx="0" cy="0"/>
+        </a:xfrm>
+      </p:grpSpPr>
+      <p:sp>
+        <p:nvSpPr>
+          <p:cNvPr id="5" name="Rectángulo 4">
+            <a:extLst>
+              <a:ext uri="{FF2B5EF4-FFF2-40B4-BE49-F238E27FC236}">
+                <a16:creationId xmlns:a16="http://schemas.microsoft.com/office/drawing/2014/main" id="{2E7EC907-EA33-4A08-A162-3CAE668B2808}"/>
               </a:ext>
             </a:extLst>
           </p:cNvPr>
@@ -4752,16 +6263,12 @@
         </p:nvSpPr>
         <p:spPr>
           <a:xfrm>
-            <a:off x="4811281" y="5580993"/>
-            <a:ext cx="7265105" cy="1198184"/>
-          </a:xfrm>
-          <a:prstGeom prst="wedgeRectCallout">
-            <a:avLst>
-              <a:gd name="adj1" fmla="val -63077"/>
-              <a:gd name="adj2" fmla="val -22922"/>
-            </a:avLst>
+            <a:off x="4166886" y="2093694"/>
+            <a:ext cx="7354388" cy="4950823"/>
+          </a:xfrm>
+          <a:prstGeom prst="rect">
+            <a:avLst/>
           </a:prstGeom>
-          <a:noFill/>
         </p:spPr>
         <p:style>
           <a:lnRef idx="2">
@@ -4780,262 +6287,252 @@
           </a:fontRef>
         </p:style>
         <p:txBody>
+          <a:bodyPr rtlCol="0" anchor="t"/>
+          <a:lstStyle/>
+          <a:p>
+            <a:pPr algn="ctr"/>
+            <a:r>
+              <a:rPr lang="es-ES" dirty="0"/>
+              <a:t>PROGRAMA</a:t>
+            </a:r>
+            <a:endParaRPr lang="es-CO" dirty="0"/>
+          </a:p>
+        </p:txBody>
+      </p:sp>
+      <p:sp>
+        <p:nvSpPr>
+          <p:cNvPr id="2" name="Título 1">
+            <a:extLst>
+              <a:ext uri="{FF2B5EF4-FFF2-40B4-BE49-F238E27FC236}">
+                <a16:creationId xmlns:a16="http://schemas.microsoft.com/office/drawing/2014/main" id="{8BA6D4EF-C7C2-427B-888C-A8030A09C4CE}"/>
+              </a:ext>
+            </a:extLst>
+          </p:cNvPr>
+          <p:cNvSpPr>
+            <a:spLocks noGrp="1"/>
+          </p:cNvSpPr>
+          <p:nvPr>
+            <p:ph type="title"/>
+          </p:nvPr>
+        </p:nvSpPr>
+        <p:spPr>
+          <a:xfrm>
+            <a:off x="949960" y="413810"/>
+            <a:ext cx="11917680" cy="825100"/>
+          </a:xfrm>
+        </p:spPr>
+        <p:txBody>
+          <a:bodyPr>
+            <a:normAutofit/>
+          </a:bodyPr>
+          <a:lstStyle/>
+          <a:p>
+            <a:r>
+              <a:rPr lang="es-ES" sz="4000" dirty="0"/>
+              <a:t>En qué lugar van en el programa?</a:t>
+            </a:r>
+            <a:endParaRPr lang="es-CO" sz="4000" dirty="0"/>
+          </a:p>
+        </p:txBody>
+      </p:sp>
+      <p:sp>
+        <p:nvSpPr>
+          <p:cNvPr id="4" name="Rectángulo 3">
+            <a:extLst>
+              <a:ext uri="{FF2B5EF4-FFF2-40B4-BE49-F238E27FC236}">
+                <a16:creationId xmlns:a16="http://schemas.microsoft.com/office/drawing/2014/main" id="{400BAF08-3D98-44A7-9B29-0C3C2AA77929}"/>
+              </a:ext>
+            </a:extLst>
+          </p:cNvPr>
+          <p:cNvSpPr/>
+          <p:nvPr/>
+        </p:nvSpPr>
+        <p:spPr>
+          <a:xfrm>
+            <a:off x="5035566" y="2738242"/>
+            <a:ext cx="5355772" cy="1201783"/>
+          </a:xfrm>
+          <a:prstGeom prst="rect">
+            <a:avLst/>
+          </a:prstGeom>
+        </p:spPr>
+        <p:style>
+          <a:lnRef idx="2">
+            <a:schemeClr val="accent6">
+              <a:shade val="50000"/>
+            </a:schemeClr>
+          </a:lnRef>
+          <a:fillRef idx="1">
+            <a:schemeClr val="accent6"/>
+          </a:fillRef>
+          <a:effectRef idx="0">
+            <a:schemeClr val="accent6"/>
+          </a:effectRef>
+          <a:fontRef idx="minor">
+            <a:schemeClr val="lt1"/>
+          </a:fontRef>
+        </p:style>
+        <p:txBody>
           <a:bodyPr rtlCol="0" anchor="ctr"/>
           <a:lstStyle/>
           <a:p>
             <a:pPr algn="ctr"/>
             <a:r>
-              <a:rPr lang="en-US" dirty="0" err="1">
-                <a:solidFill>
-                  <a:schemeClr val="tx1"/>
-                </a:solidFill>
-              </a:rPr>
-              <a:t>En</a:t>
-            </a:r>
-            <a:r>
-              <a:rPr lang="en-US" dirty="0">
-                <a:solidFill>
-                  <a:schemeClr val="tx1"/>
-                </a:solidFill>
-              </a:rPr>
-              <a:t> </a:t>
-            </a:r>
-            <a:r>
-              <a:rPr lang="en-US" dirty="0" err="1">
-                <a:solidFill>
-                  <a:schemeClr val="tx1"/>
-                </a:solidFill>
-              </a:rPr>
-              <a:t>una</a:t>
-            </a:r>
-            <a:r>
-              <a:rPr lang="en-US" dirty="0">
-                <a:solidFill>
-                  <a:schemeClr val="tx1"/>
-                </a:solidFill>
-              </a:rPr>
-              <a:t> </a:t>
-            </a:r>
-            <a:r>
-              <a:rPr lang="en-US" dirty="0" err="1">
-                <a:solidFill>
-                  <a:schemeClr val="tx1"/>
-                </a:solidFill>
-              </a:rPr>
-              <a:t>función</a:t>
-            </a:r>
-            <a:r>
-              <a:rPr lang="en-US" dirty="0">
-                <a:solidFill>
-                  <a:schemeClr val="tx1"/>
-                </a:solidFill>
-              </a:rPr>
-              <a:t> </a:t>
-            </a:r>
-            <a:r>
-              <a:rPr lang="en-US" dirty="0" err="1">
-                <a:solidFill>
-                  <a:schemeClr val="tx1"/>
-                </a:solidFill>
-              </a:rPr>
-              <a:t>retorna</a:t>
-            </a:r>
-            <a:r>
-              <a:rPr lang="en-US" dirty="0">
-                <a:solidFill>
-                  <a:schemeClr val="tx1"/>
-                </a:solidFill>
-              </a:rPr>
-              <a:t> un valor del </a:t>
-            </a:r>
-            <a:r>
-              <a:rPr lang="en-US" dirty="0" err="1">
-                <a:solidFill>
-                  <a:schemeClr val="tx1"/>
-                </a:solidFill>
-              </a:rPr>
-              <a:t>mismo</a:t>
-            </a:r>
-            <a:r>
-              <a:rPr lang="en-US" dirty="0">
-                <a:solidFill>
-                  <a:schemeClr val="tx1"/>
-                </a:solidFill>
-              </a:rPr>
-              <a:t> </a:t>
-            </a:r>
-            <a:r>
-              <a:rPr lang="en-US" dirty="0" err="1">
-                <a:solidFill>
-                  <a:schemeClr val="tx1"/>
-                </a:solidFill>
-              </a:rPr>
-              <a:t>tipo</a:t>
-            </a:r>
-            <a:r>
-              <a:rPr lang="en-US" dirty="0">
-                <a:solidFill>
-                  <a:schemeClr val="tx1"/>
-                </a:solidFill>
-              </a:rPr>
-              <a:t> de la </a:t>
-            </a:r>
-            <a:r>
-              <a:rPr lang="en-US" dirty="0" err="1">
-                <a:solidFill>
-                  <a:schemeClr val="tx1"/>
-                </a:solidFill>
-              </a:rPr>
-              <a:t>función</a:t>
-            </a:r>
-            <a:endParaRPr lang="en-US" dirty="0">
-              <a:solidFill>
-                <a:schemeClr val="tx1"/>
-              </a:solidFill>
-            </a:endParaRPr>
-          </a:p>
+              <a:rPr lang="es-ES" dirty="0" err="1"/>
+              <a:t>main</a:t>
+            </a:r>
+            <a:endParaRPr lang="es-CO" dirty="0"/>
+          </a:p>
+        </p:txBody>
+      </p:sp>
+      <p:sp>
+        <p:nvSpPr>
+          <p:cNvPr id="6" name="Rectángulo 5">
+            <a:extLst>
+              <a:ext uri="{FF2B5EF4-FFF2-40B4-BE49-F238E27FC236}">
+                <a16:creationId xmlns:a16="http://schemas.microsoft.com/office/drawing/2014/main" id="{52565B3D-1C97-45E3-A982-7F5C8FAE8633}"/>
+              </a:ext>
+            </a:extLst>
+          </p:cNvPr>
+          <p:cNvSpPr/>
+          <p:nvPr/>
+        </p:nvSpPr>
+        <p:spPr>
+          <a:xfrm>
+            <a:off x="5035566" y="4464602"/>
+            <a:ext cx="5355772" cy="1064623"/>
+          </a:xfrm>
+          <a:prstGeom prst="rect">
+            <a:avLst/>
+          </a:prstGeom>
+        </p:spPr>
+        <p:style>
+          <a:lnRef idx="2">
+            <a:schemeClr val="accent3">
+              <a:shade val="50000"/>
+            </a:schemeClr>
+          </a:lnRef>
+          <a:fillRef idx="1">
+            <a:schemeClr val="accent3"/>
+          </a:fillRef>
+          <a:effectRef idx="0">
+            <a:schemeClr val="accent3"/>
+          </a:effectRef>
+          <a:fontRef idx="minor">
+            <a:schemeClr val="lt1"/>
+          </a:fontRef>
+        </p:style>
+        <p:txBody>
+          <a:bodyPr rtlCol="0" anchor="ctr"/>
+          <a:lstStyle/>
           <a:p>
             <a:pPr algn="ctr"/>
             <a:r>
-              <a:rPr lang="en-US" dirty="0" err="1">
-                <a:solidFill>
-                  <a:schemeClr val="tx1"/>
-                </a:solidFill>
-              </a:rPr>
-              <a:t>En</a:t>
-            </a:r>
-            <a:r>
-              <a:rPr lang="en-US" dirty="0">
-                <a:solidFill>
-                  <a:schemeClr val="tx1"/>
-                </a:solidFill>
-              </a:rPr>
-              <a:t> un </a:t>
-            </a:r>
-            <a:r>
-              <a:rPr lang="en-US" dirty="0" err="1">
-                <a:solidFill>
-                  <a:schemeClr val="tx1"/>
-                </a:solidFill>
-              </a:rPr>
-              <a:t>procedimiento</a:t>
-            </a:r>
-            <a:r>
-              <a:rPr lang="en-US" dirty="0">
-                <a:solidFill>
-                  <a:schemeClr val="tx1"/>
-                </a:solidFill>
-              </a:rPr>
-              <a:t> se </a:t>
-            </a:r>
-            <a:r>
-              <a:rPr lang="en-US" dirty="0" err="1">
-                <a:solidFill>
-                  <a:schemeClr val="tx1"/>
-                </a:solidFill>
-              </a:rPr>
-              <a:t>usa</a:t>
-            </a:r>
-            <a:r>
-              <a:rPr lang="en-US" dirty="0">
-                <a:solidFill>
-                  <a:schemeClr val="tx1"/>
-                </a:solidFill>
-              </a:rPr>
-              <a:t> solo la palabra return para </a:t>
-            </a:r>
-            <a:r>
-              <a:rPr lang="en-US" dirty="0" err="1">
-                <a:solidFill>
-                  <a:schemeClr val="tx1"/>
-                </a:solidFill>
-              </a:rPr>
-              <a:t>finalizar</a:t>
-            </a:r>
-            <a:r>
-              <a:rPr lang="en-US" dirty="0">
-                <a:solidFill>
-                  <a:schemeClr val="tx1"/>
-                </a:solidFill>
-              </a:rPr>
-              <a:t> la </a:t>
-            </a:r>
-            <a:r>
-              <a:rPr lang="en-US" dirty="0" err="1">
-                <a:solidFill>
-                  <a:schemeClr val="tx1"/>
-                </a:solidFill>
-              </a:rPr>
-              <a:t>ejecución</a:t>
-            </a:r>
-            <a:endParaRPr lang="en-US" dirty="0">
-              <a:solidFill>
-                <a:schemeClr val="tx1"/>
-              </a:solidFill>
-            </a:endParaRPr>
-          </a:p>
+              <a:rPr lang="es-ES" dirty="0"/>
+              <a:t>Función</a:t>
+            </a:r>
+            <a:endParaRPr lang="es-CO" dirty="0"/>
+          </a:p>
+        </p:txBody>
+      </p:sp>
+      <p:sp>
+        <p:nvSpPr>
+          <p:cNvPr id="7" name="Rectángulo 6">
+            <a:extLst>
+              <a:ext uri="{FF2B5EF4-FFF2-40B4-BE49-F238E27FC236}">
+                <a16:creationId xmlns:a16="http://schemas.microsoft.com/office/drawing/2014/main" id="{83602483-C30A-4F9F-8E88-FFA1B0F7232A}"/>
+              </a:ext>
+            </a:extLst>
+          </p:cNvPr>
+          <p:cNvSpPr/>
+          <p:nvPr/>
+        </p:nvSpPr>
+        <p:spPr>
+          <a:xfrm>
+            <a:off x="5057336" y="5714282"/>
+            <a:ext cx="5355772" cy="1064623"/>
+          </a:xfrm>
+          <a:prstGeom prst="rect">
+            <a:avLst/>
+          </a:prstGeom>
+        </p:spPr>
+        <p:style>
+          <a:lnRef idx="2">
+            <a:schemeClr val="accent3">
+              <a:shade val="50000"/>
+            </a:schemeClr>
+          </a:lnRef>
+          <a:fillRef idx="1">
+            <a:schemeClr val="accent3"/>
+          </a:fillRef>
+          <a:effectRef idx="0">
+            <a:schemeClr val="accent3"/>
+          </a:effectRef>
+          <a:fontRef idx="minor">
+            <a:schemeClr val="lt1"/>
+          </a:fontRef>
+        </p:style>
+        <p:txBody>
+          <a:bodyPr rtlCol="0" anchor="ctr"/>
+          <a:lstStyle/>
           <a:p>
             <a:pPr algn="ctr"/>
             <a:r>
-              <a:rPr lang="en-US" dirty="0">
-                <a:solidFill>
-                  <a:schemeClr val="tx1"/>
-                </a:solidFill>
-              </a:rPr>
-              <a:t>Las </a:t>
-            </a:r>
-            <a:r>
-              <a:rPr lang="en-US" dirty="0" err="1">
-                <a:solidFill>
-                  <a:schemeClr val="tx1"/>
-                </a:solidFill>
-              </a:rPr>
-              <a:t>instrucciones</a:t>
-            </a:r>
-            <a:r>
-              <a:rPr lang="en-US" dirty="0">
-                <a:solidFill>
-                  <a:schemeClr val="tx1"/>
-                </a:solidFill>
-              </a:rPr>
-              <a:t> que van </a:t>
-            </a:r>
-            <a:r>
-              <a:rPr lang="en-US" dirty="0" err="1">
-                <a:solidFill>
-                  <a:schemeClr val="tx1"/>
-                </a:solidFill>
-              </a:rPr>
-              <a:t>luego</a:t>
-            </a:r>
-            <a:r>
-              <a:rPr lang="en-US" dirty="0">
-                <a:solidFill>
-                  <a:schemeClr val="tx1"/>
-                </a:solidFill>
-              </a:rPr>
-              <a:t> de un return, no se </a:t>
-            </a:r>
-            <a:r>
-              <a:rPr lang="en-US" dirty="0" err="1">
-                <a:solidFill>
-                  <a:schemeClr val="tx1"/>
-                </a:solidFill>
-              </a:rPr>
-              <a:t>ejecutan</a:t>
-            </a:r>
-            <a:endParaRPr lang="es-CO" dirty="0">
-              <a:solidFill>
-                <a:schemeClr val="tx1"/>
-              </a:solidFill>
-            </a:endParaRPr>
+              <a:rPr lang="es-ES" dirty="0"/>
+              <a:t>Función</a:t>
+            </a:r>
+            <a:endParaRPr lang="es-CO" dirty="0"/>
+          </a:p>
+        </p:txBody>
+      </p:sp>
+      <p:sp>
+        <p:nvSpPr>
+          <p:cNvPr id="8" name="CuadroTexto 7">
+            <a:extLst>
+              <a:ext uri="{FF2B5EF4-FFF2-40B4-BE49-F238E27FC236}">
+                <a16:creationId xmlns:a16="http://schemas.microsoft.com/office/drawing/2014/main" id="{E52E8DE9-4AC8-4607-A773-20C46997D07F}"/>
+              </a:ext>
+            </a:extLst>
+          </p:cNvPr>
+          <p:cNvSpPr txBox="1"/>
+          <p:nvPr/>
+        </p:nvSpPr>
+        <p:spPr>
+          <a:xfrm rot="10800000" flipH="1" flipV="1">
+            <a:off x="751775" y="3563034"/>
+            <a:ext cx="2674487" cy="646331"/>
+          </a:xfrm>
+          <a:prstGeom prst="rect">
+            <a:avLst/>
+          </a:prstGeom>
+          <a:noFill/>
+        </p:spPr>
+        <p:txBody>
+          <a:bodyPr wrap="square" rtlCol="0">
+            <a:spAutoFit/>
+          </a:bodyPr>
+          <a:lstStyle/>
+          <a:p>
+            <a:r>
+              <a:rPr lang="es-ES" dirty="0"/>
+              <a:t>Vamos a ponerlas debajo del bloque </a:t>
+            </a:r>
+            <a:r>
+              <a:rPr lang="es-ES" dirty="0" err="1"/>
+              <a:t>main</a:t>
+            </a:r>
+            <a:r>
+              <a:rPr lang="es-ES" dirty="0"/>
+              <a:t>.</a:t>
+            </a:r>
+            <a:endParaRPr lang="es-CO" dirty="0"/>
           </a:p>
         </p:txBody>
       </p:sp>
     </p:spTree>
     <p:extLst>
       <p:ext uri="{BB962C8B-B14F-4D97-AF65-F5344CB8AC3E}">
-        <p14:creationId xmlns:p14="http://schemas.microsoft.com/office/powerpoint/2010/main" val="3794522921"/>
+        <p14:creationId xmlns:p14="http://schemas.microsoft.com/office/powerpoint/2010/main" val="420833290"/>
       </p:ext>
     </p:extLst>
   </p:cSld>
@@ -5045,7 +6542,7 @@
 </p:sld>
 </file>
 
-<file path=ppt/slides/slide11.xml><?xml version="1.0" encoding="utf-8"?>
+<file path=ppt/slides/slide13.xml><?xml version="1.0" encoding="utf-8"?>
 <p:sld xmlns:a="http://schemas.openxmlformats.org/drawingml/2006/main" xmlns:r="http://schemas.openxmlformats.org/officeDocument/2006/relationships" xmlns:p="http://schemas.openxmlformats.org/presentationml/2006/main">
   <p:cSld>
     <p:spTree>
@@ -6693,7 +8190,7 @@
         <p:spPr>
           <a:xfrm>
             <a:off x="2799695" y="5098041"/>
-            <a:ext cx="3449573" cy="646331"/>
+            <a:ext cx="3449573" cy="923330"/>
           </a:xfrm>
           <a:prstGeom prst="rect">
             <a:avLst/>
@@ -6712,7 +8209,7 @@
                   <a:srgbClr val="00FF00"/>
                 </a:solidFill>
               </a:rPr>
-              <a:t>Recibe: el almuerzo o un mensaje que no había lo que ella quería </a:t>
+              <a:t>Recibe: el almuerzo o un mensaje que no había lo que ella quería. Además recibe la devuelta.</a:t>
             </a:r>
             <a:endParaRPr lang="es-CO" b="1" dirty="0">
               <a:solidFill>
@@ -6737,7 +8234,7 @@
         <p:spPr>
           <a:xfrm>
             <a:off x="7696031" y="2338086"/>
-            <a:ext cx="4827777" cy="3970318"/>
+            <a:ext cx="4827777" cy="3416320"/>
           </a:xfrm>
           <a:prstGeom prst="rect">
             <a:avLst/>
@@ -6783,7 +8280,7 @@
             </a:r>
             <a:r>
               <a:rPr lang="es-ES" dirty="0"/>
-              <a:t>), le entrega algo ($$ y el almuerzo que quiere )o puede no entregarle nada para que este haga su tarea</a:t>
+              <a:t>), le entrega algo ($$ y el almuerzo que quiere )</a:t>
             </a:r>
           </a:p>
           <a:p>
@@ -6793,7 +8290,7 @@
             </a:pPr>
             <a:r>
               <a:rPr lang="es-ES" dirty="0"/>
-              <a:t>El programa llamado(Comprar Almuerzos) debe devolver algo(el almuerzo o un mensaje que no había ese almuerzo) o no puede devolver nada</a:t>
+              <a:t>El programa llamado(Comprar Almuerzos) debe devolver algo(el almuerzo o un mensaje que no había ese almuerzo y la devuelta)</a:t>
             </a:r>
           </a:p>
           <a:p>
@@ -7039,6 +8536,51 @@
                       </p:childTnLst>
                     </p:cTn>
                   </p:par>
+                  <p:par>
+                    <p:cTn id="21" fill="hold">
+                      <p:stCondLst>
+                        <p:cond delay="indefinite"/>
+                      </p:stCondLst>
+                      <p:childTnLst>
+                        <p:par>
+                          <p:cTn id="22" fill="hold">
+                            <p:stCondLst>
+                              <p:cond delay="0"/>
+                            </p:stCondLst>
+                            <p:childTnLst>
+                              <p:par>
+                                <p:cTn id="23" presetID="1" presetClass="entr" presetSubtype="0" fill="hold" grpId="0" nodeType="clickEffect">
+                                  <p:stCondLst>
+                                    <p:cond delay="0"/>
+                                  </p:stCondLst>
+                                  <p:childTnLst>
+                                    <p:set>
+                                      <p:cBhvr>
+                                        <p:cTn id="24" dur="1" fill="hold">
+                                          <p:stCondLst>
+                                            <p:cond delay="0"/>
+                                          </p:stCondLst>
+                                        </p:cTn>
+                                        <p:tgtEl>
+                                          <p:spTgt spid="18"/>
+                                        </p:tgtEl>
+                                        <p:attrNameLst>
+                                          <p:attrName>style.visibility</p:attrName>
+                                        </p:attrNameLst>
+                                      </p:cBhvr>
+                                      <p:to>
+                                        <p:strVal val="visible"/>
+                                      </p:to>
+                                    </p:set>
+                                  </p:childTnLst>
+                                </p:cTn>
+                              </p:par>
+                            </p:childTnLst>
+                          </p:cTn>
+                        </p:par>
+                      </p:childTnLst>
+                    </p:cTn>
+                  </p:par>
                 </p:childTnLst>
               </p:cTn>
               <p:prevCondLst>
@@ -7064,6 +8606,7 @@
       <p:bldP spid="9" grpId="0"/>
       <p:bldP spid="12" grpId="0"/>
       <p:bldP spid="17" grpId="0"/>
+      <p:bldP spid="18" grpId="0"/>
     </p:bldLst>
   </p:timing>
 </p:sld>
@@ -8020,7 +9563,7 @@
                             </p:stCondLst>
                             <p:childTnLst>
                               <p:par>
-                                <p:cTn id="5" presetID="1" presetClass="entr" presetSubtype="0" fill="hold" nodeType="clickEffect">
+                                <p:cTn id="5" presetID="1" presetClass="entr" presetSubtype="0" fill="hold" grpId="0" nodeType="clickEffect">
                                   <p:stCondLst>
                                     <p:cond delay="0"/>
                                   </p:stCondLst>
@@ -8028,6 +9571,51 @@
                                     <p:set>
                                       <p:cBhvr>
                                         <p:cTn id="6" dur="1" fill="hold">
+                                          <p:stCondLst>
+                                            <p:cond delay="0"/>
+                                          </p:stCondLst>
+                                        </p:cTn>
+                                        <p:tgtEl>
+                                          <p:spTgt spid="14"/>
+                                        </p:tgtEl>
+                                        <p:attrNameLst>
+                                          <p:attrName>style.visibility</p:attrName>
+                                        </p:attrNameLst>
+                                      </p:cBhvr>
+                                      <p:to>
+                                        <p:strVal val="visible"/>
+                                      </p:to>
+                                    </p:set>
+                                  </p:childTnLst>
+                                </p:cTn>
+                              </p:par>
+                            </p:childTnLst>
+                          </p:cTn>
+                        </p:par>
+                      </p:childTnLst>
+                    </p:cTn>
+                  </p:par>
+                  <p:par>
+                    <p:cTn id="7" fill="hold">
+                      <p:stCondLst>
+                        <p:cond delay="indefinite"/>
+                      </p:stCondLst>
+                      <p:childTnLst>
+                        <p:par>
+                          <p:cTn id="8" fill="hold">
+                            <p:stCondLst>
+                              <p:cond delay="0"/>
+                            </p:stCondLst>
+                            <p:childTnLst>
+                              <p:par>
+                                <p:cTn id="9" presetID="1" presetClass="entr" presetSubtype="0" fill="hold" nodeType="clickEffect">
+                                  <p:stCondLst>
+                                    <p:cond delay="0"/>
+                                  </p:stCondLst>
+                                  <p:childTnLst>
+                                    <p:set>
+                                      <p:cBhvr>
+                                        <p:cTn id="10" dur="1" fill="hold">
                                           <p:stCondLst>
                                             <p:cond delay="0"/>
                                           </p:stCondLst>
@@ -8047,20 +9635,380 @@
                                 </p:cTn>
                               </p:par>
                               <p:par>
-                                <p:cTn id="7" presetID="1" presetClass="entr" presetSubtype="0" fill="hold" grpId="0" nodeType="withEffect">
+                                <p:cTn id="11" presetID="1" presetClass="entr" presetSubtype="0" fill="hold" grpId="0" nodeType="withEffect">
                                   <p:stCondLst>
                                     <p:cond delay="0"/>
                                   </p:stCondLst>
                                   <p:childTnLst>
                                     <p:set>
                                       <p:cBhvr>
-                                        <p:cTn id="8" dur="1" fill="hold">
+                                        <p:cTn id="12" dur="1" fill="hold">
                                           <p:stCondLst>
                                             <p:cond delay="0"/>
                                           </p:stCondLst>
                                         </p:cTn>
                                         <p:tgtEl>
                                           <p:spTgt spid="12"/>
+                                        </p:tgtEl>
+                                        <p:attrNameLst>
+                                          <p:attrName>style.visibility</p:attrName>
+                                        </p:attrNameLst>
+                                      </p:cBhvr>
+                                      <p:to>
+                                        <p:strVal val="visible"/>
+                                      </p:to>
+                                    </p:set>
+                                  </p:childTnLst>
+                                </p:cTn>
+                              </p:par>
+                            </p:childTnLst>
+                          </p:cTn>
+                        </p:par>
+                      </p:childTnLst>
+                    </p:cTn>
+                  </p:par>
+                  <p:par>
+                    <p:cTn id="13" fill="hold">
+                      <p:stCondLst>
+                        <p:cond delay="indefinite"/>
+                      </p:stCondLst>
+                      <p:childTnLst>
+                        <p:par>
+                          <p:cTn id="14" fill="hold">
+                            <p:stCondLst>
+                              <p:cond delay="0"/>
+                            </p:stCondLst>
+                            <p:childTnLst>
+                              <p:par>
+                                <p:cTn id="15" presetID="1" presetClass="entr" presetSubtype="0" fill="hold" nodeType="clickEffect">
+                                  <p:stCondLst>
+                                    <p:cond delay="0"/>
+                                  </p:stCondLst>
+                                  <p:childTnLst>
+                                    <p:set>
+                                      <p:cBhvr>
+                                        <p:cTn id="16" dur="1" fill="hold">
+                                          <p:stCondLst>
+                                            <p:cond delay="0"/>
+                                          </p:stCondLst>
+                                        </p:cTn>
+                                        <p:tgtEl>
+                                          <p:spTgt spid="16"/>
+                                        </p:tgtEl>
+                                        <p:attrNameLst>
+                                          <p:attrName>style.visibility</p:attrName>
+                                        </p:attrNameLst>
+                                      </p:cBhvr>
+                                      <p:to>
+                                        <p:strVal val="visible"/>
+                                      </p:to>
+                                    </p:set>
+                                  </p:childTnLst>
+                                </p:cTn>
+                              </p:par>
+                              <p:par>
+                                <p:cTn id="17" presetID="1" presetClass="entr" presetSubtype="0" fill="hold" nodeType="withEffect">
+                                  <p:stCondLst>
+                                    <p:cond delay="0"/>
+                                  </p:stCondLst>
+                                  <p:childTnLst>
+                                    <p:set>
+                                      <p:cBhvr>
+                                        <p:cTn id="18" dur="1" fill="hold">
+                                          <p:stCondLst>
+                                            <p:cond delay="0"/>
+                                          </p:stCondLst>
+                                        </p:cTn>
+                                        <p:tgtEl>
+                                          <p:spTgt spid="19"/>
+                                        </p:tgtEl>
+                                        <p:attrNameLst>
+                                          <p:attrName>style.visibility</p:attrName>
+                                        </p:attrNameLst>
+                                      </p:cBhvr>
+                                      <p:to>
+                                        <p:strVal val="visible"/>
+                                      </p:to>
+                                    </p:set>
+                                  </p:childTnLst>
+                                </p:cTn>
+                              </p:par>
+                              <p:par>
+                                <p:cTn id="19" presetID="1" presetClass="entr" presetSubtype="0" fill="hold" nodeType="withEffect">
+                                  <p:stCondLst>
+                                    <p:cond delay="0"/>
+                                  </p:stCondLst>
+                                  <p:childTnLst>
+                                    <p:set>
+                                      <p:cBhvr>
+                                        <p:cTn id="20" dur="1" fill="hold">
+                                          <p:stCondLst>
+                                            <p:cond delay="0"/>
+                                          </p:stCondLst>
+                                        </p:cTn>
+                                        <p:tgtEl>
+                                          <p:spTgt spid="26"/>
+                                        </p:tgtEl>
+                                        <p:attrNameLst>
+                                          <p:attrName>style.visibility</p:attrName>
+                                        </p:attrNameLst>
+                                      </p:cBhvr>
+                                      <p:to>
+                                        <p:strVal val="visible"/>
+                                      </p:to>
+                                    </p:set>
+                                  </p:childTnLst>
+                                </p:cTn>
+                              </p:par>
+                              <p:par>
+                                <p:cTn id="21" presetID="1" presetClass="entr" presetSubtype="0" fill="hold" nodeType="withEffect">
+                                  <p:stCondLst>
+                                    <p:cond delay="0"/>
+                                  </p:stCondLst>
+                                  <p:childTnLst>
+                                    <p:set>
+                                      <p:cBhvr>
+                                        <p:cTn id="22" dur="1" fill="hold">
+                                          <p:stCondLst>
+                                            <p:cond delay="0"/>
+                                          </p:stCondLst>
+                                        </p:cTn>
+                                        <p:tgtEl>
+                                          <p:spTgt spid="32"/>
+                                        </p:tgtEl>
+                                        <p:attrNameLst>
+                                          <p:attrName>style.visibility</p:attrName>
+                                        </p:attrNameLst>
+                                      </p:cBhvr>
+                                      <p:to>
+                                        <p:strVal val="visible"/>
+                                      </p:to>
+                                    </p:set>
+                                  </p:childTnLst>
+                                </p:cTn>
+                              </p:par>
+                              <p:par>
+                                <p:cTn id="23" presetID="1" presetClass="entr" presetSubtype="0" fill="hold" nodeType="withEffect">
+                                  <p:stCondLst>
+                                    <p:cond delay="0"/>
+                                  </p:stCondLst>
+                                  <p:childTnLst>
+                                    <p:set>
+                                      <p:cBhvr>
+                                        <p:cTn id="24" dur="1" fill="hold">
+                                          <p:stCondLst>
+                                            <p:cond delay="0"/>
+                                          </p:stCondLst>
+                                        </p:cTn>
+                                        <p:tgtEl>
+                                          <p:spTgt spid="38"/>
+                                        </p:tgtEl>
+                                        <p:attrNameLst>
+                                          <p:attrName>style.visibility</p:attrName>
+                                        </p:attrNameLst>
+                                      </p:cBhvr>
+                                      <p:to>
+                                        <p:strVal val="visible"/>
+                                      </p:to>
+                                    </p:set>
+                                  </p:childTnLst>
+                                </p:cTn>
+                              </p:par>
+                              <p:par>
+                                <p:cTn id="25" presetID="1" presetClass="entr" presetSubtype="0" fill="hold" nodeType="withEffect">
+                                  <p:stCondLst>
+                                    <p:cond delay="0"/>
+                                  </p:stCondLst>
+                                  <p:childTnLst>
+                                    <p:set>
+                                      <p:cBhvr>
+                                        <p:cTn id="26" dur="1" fill="hold">
+                                          <p:stCondLst>
+                                            <p:cond delay="0"/>
+                                          </p:stCondLst>
+                                        </p:cTn>
+                                        <p:tgtEl>
+                                          <p:spTgt spid="44"/>
+                                        </p:tgtEl>
+                                        <p:attrNameLst>
+                                          <p:attrName>style.visibility</p:attrName>
+                                        </p:attrNameLst>
+                                      </p:cBhvr>
+                                      <p:to>
+                                        <p:strVal val="visible"/>
+                                      </p:to>
+                                    </p:set>
+                                  </p:childTnLst>
+                                </p:cTn>
+                              </p:par>
+                            </p:childTnLst>
+                          </p:cTn>
+                        </p:par>
+                      </p:childTnLst>
+                    </p:cTn>
+                  </p:par>
+                  <p:par>
+                    <p:cTn id="27" fill="hold">
+                      <p:stCondLst>
+                        <p:cond delay="indefinite"/>
+                      </p:stCondLst>
+                      <p:childTnLst>
+                        <p:par>
+                          <p:cTn id="28" fill="hold">
+                            <p:stCondLst>
+                              <p:cond delay="0"/>
+                            </p:stCondLst>
+                            <p:childTnLst>
+                              <p:par>
+                                <p:cTn id="29" presetID="1" presetClass="entr" presetSubtype="0" fill="hold" nodeType="clickEffect">
+                                  <p:stCondLst>
+                                    <p:cond delay="0"/>
+                                  </p:stCondLst>
+                                  <p:childTnLst>
+                                    <p:set>
+                                      <p:cBhvr>
+                                        <p:cTn id="30" dur="1" fill="hold">
+                                          <p:stCondLst>
+                                            <p:cond delay="0"/>
+                                          </p:stCondLst>
+                                        </p:cTn>
+                                        <p:tgtEl>
+                                          <p:spTgt spid="18"/>
+                                        </p:tgtEl>
+                                        <p:attrNameLst>
+                                          <p:attrName>style.visibility</p:attrName>
+                                        </p:attrNameLst>
+                                      </p:cBhvr>
+                                      <p:to>
+                                        <p:strVal val="visible"/>
+                                      </p:to>
+                                    </p:set>
+                                  </p:childTnLst>
+                                </p:cTn>
+                              </p:par>
+                              <p:par>
+                                <p:cTn id="31" presetID="1" presetClass="entr" presetSubtype="0" fill="hold" nodeType="withEffect">
+                                  <p:stCondLst>
+                                    <p:cond delay="0"/>
+                                  </p:stCondLst>
+                                  <p:childTnLst>
+                                    <p:set>
+                                      <p:cBhvr>
+                                        <p:cTn id="32" dur="1" fill="hold">
+                                          <p:stCondLst>
+                                            <p:cond delay="0"/>
+                                          </p:stCondLst>
+                                        </p:cTn>
+                                        <p:tgtEl>
+                                          <p:spTgt spid="20"/>
+                                        </p:tgtEl>
+                                        <p:attrNameLst>
+                                          <p:attrName>style.visibility</p:attrName>
+                                        </p:attrNameLst>
+                                      </p:cBhvr>
+                                      <p:to>
+                                        <p:strVal val="visible"/>
+                                      </p:to>
+                                    </p:set>
+                                  </p:childTnLst>
+                                </p:cTn>
+                              </p:par>
+                              <p:par>
+                                <p:cTn id="33" presetID="1" presetClass="entr" presetSubtype="0" fill="hold" nodeType="withEffect">
+                                  <p:stCondLst>
+                                    <p:cond delay="0"/>
+                                  </p:stCondLst>
+                                  <p:childTnLst>
+                                    <p:set>
+                                      <p:cBhvr>
+                                        <p:cTn id="34" dur="1" fill="hold">
+                                          <p:stCondLst>
+                                            <p:cond delay="0"/>
+                                          </p:stCondLst>
+                                        </p:cTn>
+                                        <p:tgtEl>
+                                          <p:spTgt spid="27"/>
+                                        </p:tgtEl>
+                                        <p:attrNameLst>
+                                          <p:attrName>style.visibility</p:attrName>
+                                        </p:attrNameLst>
+                                      </p:cBhvr>
+                                      <p:to>
+                                        <p:strVal val="visible"/>
+                                      </p:to>
+                                    </p:set>
+                                  </p:childTnLst>
+                                </p:cTn>
+                              </p:par>
+                              <p:par>
+                                <p:cTn id="35" presetID="1" presetClass="entr" presetSubtype="0" fill="hold" nodeType="withEffect">
+                                  <p:stCondLst>
+                                    <p:cond delay="0"/>
+                                  </p:stCondLst>
+                                  <p:childTnLst>
+                                    <p:set>
+                                      <p:cBhvr>
+                                        <p:cTn id="36" dur="1" fill="hold">
+                                          <p:stCondLst>
+                                            <p:cond delay="0"/>
+                                          </p:stCondLst>
+                                        </p:cTn>
+                                        <p:tgtEl>
+                                          <p:spTgt spid="33"/>
+                                        </p:tgtEl>
+                                        <p:attrNameLst>
+                                          <p:attrName>style.visibility</p:attrName>
+                                        </p:attrNameLst>
+                                      </p:cBhvr>
+                                      <p:to>
+                                        <p:strVal val="visible"/>
+                                      </p:to>
+                                    </p:set>
+                                  </p:childTnLst>
+                                </p:cTn>
+                              </p:par>
+                              <p:par>
+                                <p:cTn id="37" presetID="1" presetClass="entr" presetSubtype="0" fill="hold" nodeType="withEffect">
+                                  <p:stCondLst>
+                                    <p:cond delay="0"/>
+                                  </p:stCondLst>
+                                  <p:childTnLst>
+                                    <p:set>
+                                      <p:cBhvr>
+                                        <p:cTn id="38" dur="1" fill="hold">
+                                          <p:stCondLst>
+                                            <p:cond delay="0"/>
+                                          </p:stCondLst>
+                                        </p:cTn>
+                                        <p:tgtEl>
+                                          <p:spTgt spid="39"/>
+                                        </p:tgtEl>
+                                        <p:attrNameLst>
+                                          <p:attrName>style.visibility</p:attrName>
+                                        </p:attrNameLst>
+                                      </p:cBhvr>
+                                      <p:to>
+                                        <p:strVal val="visible"/>
+                                      </p:to>
+                                    </p:set>
+                                  </p:childTnLst>
+                                </p:cTn>
+                              </p:par>
+                              <p:par>
+                                <p:cTn id="39" presetID="1" presetClass="entr" presetSubtype="0" fill="hold" nodeType="withEffect">
+                                  <p:stCondLst>
+                                    <p:cond delay="0"/>
+                                  </p:stCondLst>
+                                  <p:childTnLst>
+                                    <p:set>
+                                      <p:cBhvr>
+                                        <p:cTn id="40" dur="1" fill="hold">
+                                          <p:stCondLst>
+                                            <p:cond delay="0"/>
+                                          </p:stCondLst>
+                                        </p:cTn>
+                                        <p:tgtEl>
+                                          <p:spTgt spid="45"/>
                                         </p:tgtEl>
                                         <p:attrNameLst>
                                           <p:attrName>style.visibility</p:attrName>
@@ -8102,6 +10050,7 @@
     </p:tnLst>
     <p:bldLst>
       <p:bldP spid="12" grpId="0"/>
+      <p:bldP spid="14" grpId="0"/>
     </p:bldLst>
   </p:timing>
 </p:sld>
@@ -8977,6 +10926,204 @@
                       </p:childTnLst>
                     </p:cTn>
                   </p:par>
+                  <p:par>
+                    <p:cTn id="19" fill="hold">
+                      <p:stCondLst>
+                        <p:cond delay="indefinite"/>
+                      </p:stCondLst>
+                      <p:childTnLst>
+                        <p:par>
+                          <p:cTn id="20" fill="hold">
+                            <p:stCondLst>
+                              <p:cond delay="0"/>
+                            </p:stCondLst>
+                            <p:childTnLst>
+                              <p:par>
+                                <p:cTn id="21" presetID="1" presetClass="entr" presetSubtype="0" fill="hold" grpId="0" nodeType="clickEffect">
+                                  <p:stCondLst>
+                                    <p:cond delay="0"/>
+                                  </p:stCondLst>
+                                  <p:childTnLst>
+                                    <p:set>
+                                      <p:cBhvr>
+                                        <p:cTn id="22" dur="1" fill="hold">
+                                          <p:stCondLst>
+                                            <p:cond delay="0"/>
+                                          </p:stCondLst>
+                                        </p:cTn>
+                                        <p:tgtEl>
+                                          <p:spTgt spid="12"/>
+                                        </p:tgtEl>
+                                        <p:attrNameLst>
+                                          <p:attrName>style.visibility</p:attrName>
+                                        </p:attrNameLst>
+                                      </p:cBhvr>
+                                      <p:to>
+                                        <p:strVal val="visible"/>
+                                      </p:to>
+                                    </p:set>
+                                  </p:childTnLst>
+                                </p:cTn>
+                              </p:par>
+                            </p:childTnLst>
+                          </p:cTn>
+                        </p:par>
+                      </p:childTnLst>
+                    </p:cTn>
+                  </p:par>
+                  <p:par>
+                    <p:cTn id="23" fill="hold">
+                      <p:stCondLst>
+                        <p:cond delay="indefinite"/>
+                      </p:stCondLst>
+                      <p:childTnLst>
+                        <p:par>
+                          <p:cTn id="24" fill="hold">
+                            <p:stCondLst>
+                              <p:cond delay="0"/>
+                            </p:stCondLst>
+                            <p:childTnLst>
+                              <p:par>
+                                <p:cTn id="25" presetID="1" presetClass="entr" presetSubtype="0" fill="hold" nodeType="clickEffect">
+                                  <p:stCondLst>
+                                    <p:cond delay="0"/>
+                                  </p:stCondLst>
+                                  <p:childTnLst>
+                                    <p:set>
+                                      <p:cBhvr>
+                                        <p:cTn id="26" dur="1" fill="hold">
+                                          <p:stCondLst>
+                                            <p:cond delay="0"/>
+                                          </p:stCondLst>
+                                        </p:cTn>
+                                        <p:tgtEl>
+                                          <p:spTgt spid="14"/>
+                                        </p:tgtEl>
+                                        <p:attrNameLst>
+                                          <p:attrName>style.visibility</p:attrName>
+                                        </p:attrNameLst>
+                                      </p:cBhvr>
+                                      <p:to>
+                                        <p:strVal val="visible"/>
+                                      </p:to>
+                                    </p:set>
+                                  </p:childTnLst>
+                                </p:cTn>
+                              </p:par>
+                              <p:par>
+                                <p:cTn id="27" presetID="1" presetClass="entr" presetSubtype="0" fill="hold" nodeType="withEffect">
+                                  <p:stCondLst>
+                                    <p:cond delay="0"/>
+                                  </p:stCondLst>
+                                  <p:childTnLst>
+                                    <p:set>
+                                      <p:cBhvr>
+                                        <p:cTn id="28" dur="1" fill="hold">
+                                          <p:stCondLst>
+                                            <p:cond delay="0"/>
+                                          </p:stCondLst>
+                                        </p:cTn>
+                                        <p:tgtEl>
+                                          <p:spTgt spid="16"/>
+                                        </p:tgtEl>
+                                        <p:attrNameLst>
+                                          <p:attrName>style.visibility</p:attrName>
+                                        </p:attrNameLst>
+                                      </p:cBhvr>
+                                      <p:to>
+                                        <p:strVal val="visible"/>
+                                      </p:to>
+                                    </p:set>
+                                  </p:childTnLst>
+                                </p:cTn>
+                              </p:par>
+                              <p:par>
+                                <p:cTn id="29" presetID="1" presetClass="entr" presetSubtype="0" fill="hold" nodeType="withEffect">
+                                  <p:stCondLst>
+                                    <p:cond delay="0"/>
+                                  </p:stCondLst>
+                                  <p:childTnLst>
+                                    <p:set>
+                                      <p:cBhvr>
+                                        <p:cTn id="30" dur="1" fill="hold">
+                                          <p:stCondLst>
+                                            <p:cond delay="0"/>
+                                          </p:stCondLst>
+                                        </p:cTn>
+                                        <p:tgtEl>
+                                          <p:spTgt spid="18"/>
+                                        </p:tgtEl>
+                                        <p:attrNameLst>
+                                          <p:attrName>style.visibility</p:attrName>
+                                        </p:attrNameLst>
+                                      </p:cBhvr>
+                                      <p:to>
+                                        <p:strVal val="visible"/>
+                                      </p:to>
+                                    </p:set>
+                                  </p:childTnLst>
+                                </p:cTn>
+                              </p:par>
+                              <p:par>
+                                <p:cTn id="31" presetID="1" presetClass="entr" presetSubtype="0" fill="hold" nodeType="withEffect">
+                                  <p:stCondLst>
+                                    <p:cond delay="0"/>
+                                  </p:stCondLst>
+                                  <p:childTnLst>
+                                    <p:set>
+                                      <p:cBhvr>
+                                        <p:cTn id="32" dur="1" fill="hold">
+                                          <p:stCondLst>
+                                            <p:cond delay="0"/>
+                                          </p:stCondLst>
+                                        </p:cTn>
+                                        <p:tgtEl>
+                                          <p:spTgt spid="20"/>
+                                        </p:tgtEl>
+                                        <p:attrNameLst>
+                                          <p:attrName>style.visibility</p:attrName>
+                                        </p:attrNameLst>
+                                      </p:cBhvr>
+                                      <p:to>
+                                        <p:strVal val="visible"/>
+                                      </p:to>
+                                    </p:set>
+                                  </p:childTnLst>
+                                </p:cTn>
+                              </p:par>
+                              <p:par>
+                                <p:cTn id="33" presetID="1" presetClass="entr" presetSubtype="0" fill="hold" nodeType="withEffect">
+                                  <p:stCondLst>
+                                    <p:cond delay="0"/>
+                                  </p:stCondLst>
+                                  <p:childTnLst>
+                                    <p:set>
+                                      <p:cBhvr>
+                                        <p:cTn id="34" dur="1" fill="hold">
+                                          <p:stCondLst>
+                                            <p:cond delay="0"/>
+                                          </p:stCondLst>
+                                        </p:cTn>
+                                        <p:tgtEl>
+                                          <p:spTgt spid="22"/>
+                                        </p:tgtEl>
+                                        <p:attrNameLst>
+                                          <p:attrName>style.visibility</p:attrName>
+                                        </p:attrNameLst>
+                                      </p:cBhvr>
+                                      <p:to>
+                                        <p:strVal val="visible"/>
+                                      </p:to>
+                                    </p:set>
+                                  </p:childTnLst>
+                                </p:cTn>
+                              </p:par>
+                            </p:childTnLst>
+                          </p:cTn>
+                        </p:par>
+                      </p:childTnLst>
+                    </p:cTn>
+                  </p:par>
                 </p:childTnLst>
               </p:cTn>
               <p:prevCondLst>
@@ -9003,6 +11150,7 @@
       <p:bldP spid="6" grpId="0" animBg="1"/>
       <p:bldP spid="7" grpId="0" animBg="1"/>
       <p:bldP spid="8" grpId="0" animBg="1"/>
+      <p:bldP spid="12" grpId="0"/>
     </p:bldLst>
   </p:timing>
 </p:sld>

</xml_diff>